<commit_message>
added 3d model of a ballastank
</commit_message>
<xml_diff>
--- a/Presentaties/Sprint 4.pptx
+++ b/Presentaties/Sprint 4.pptx
@@ -120,6 +120,43 @@
     </p:ext>
   </p:extLst>
 </p:presentation>
+</file>
+
+<file path=ppt/revisionInfo.xml><?xml version="1.0" encoding="utf-8"?>
+<p1510:revInfo xmlns:a="http://schemas.openxmlformats.org/drawingml/2006/main" xmlns:r="http://schemas.openxmlformats.org/officeDocument/2006/relationships" xmlns:p1510="http://schemas.microsoft.com/office/powerpoint/2015/10/main">
+  <p1510:revLst>
+    <p1510:client id="{2C3CF025-71C6-4A79-82F7-3365A43B7B07}" v="12" dt="2025-11-25T11:40:15.735"/>
+  </p1510:revLst>
+</p1510:revInfo>
+</file>
+
+<file path=ppt/changesInfos/changesInfo1.xml><?xml version="1.0" encoding="utf-8"?>
+<pc:chgInfo xmlns:a="http://schemas.openxmlformats.org/drawingml/2006/main" xmlns:r="http://schemas.openxmlformats.org/officeDocument/2006/relationships" xmlns:ac="http://schemas.microsoft.com/office/drawing/2013/main/command" xmlns:pc="http://schemas.microsoft.com/office/powerpoint/2013/main/command">
+  <pc:docChgLst>
+    <pc:chgData name="Dax Visser (1110166)" userId="18ef0d71-56ab-4448-86a5-7ac2420fc301" providerId="ADAL" clId="{2C3CF025-71C6-4A79-82F7-3365A43B7B07}"/>
+    <pc:docChg chg="custSel modSld">
+      <pc:chgData name="Dax Visser (1110166)" userId="18ef0d71-56ab-4448-86a5-7ac2420fc301" providerId="ADAL" clId="{2C3CF025-71C6-4A79-82F7-3365A43B7B07}" dt="2025-11-25T11:40:28.514" v="27"/>
+      <pc:docMkLst>
+        <pc:docMk/>
+      </pc:docMkLst>
+      <pc:sldChg chg="addSp modSp mod modAnim">
+        <pc:chgData name="Dax Visser (1110166)" userId="18ef0d71-56ab-4448-86a5-7ac2420fc301" providerId="ADAL" clId="{2C3CF025-71C6-4A79-82F7-3365A43B7B07}" dt="2025-11-25T11:40:28.514" v="27"/>
+        <pc:sldMkLst>
+          <pc:docMk/>
+          <pc:sldMk cId="1698587137" sldId="270"/>
+        </pc:sldMkLst>
+        <pc:graphicFrameChg chg="add mod modGraphic">
+          <ac:chgData name="Dax Visser (1110166)" userId="18ef0d71-56ab-4448-86a5-7ac2420fc301" providerId="ADAL" clId="{2C3CF025-71C6-4A79-82F7-3365A43B7B07}" dt="2025-11-25T11:40:28.514" v="27"/>
+          <ac:graphicFrameMkLst>
+            <pc:docMk/>
+            <pc:sldMk cId="1698587137" sldId="270"/>
+            <ac:graphicFrameMk id="4" creationId="{D3FD436B-84D2-562C-90F8-F3980E1E393D}"/>
+          </ac:graphicFrameMkLst>
+        </pc:graphicFrameChg>
+      </pc:sldChg>
+    </pc:docChg>
+  </pc:docChgLst>
+</pc:chgInfo>
 </file>
 
 <file path=ppt/diagrams/colors1.xml><?xml version="1.0" encoding="utf-8"?>
@@ -3695,7 +3732,7 @@
           <a:p>
             <a:fld id="{D5EC4132-83FF-430E-8473-4C6C1D8D7455}" type="slidenum">
               <a:rPr lang="nl-NL" smtClean="0"/>
-              <a:t>‹#›</a:t>
+              <a:t>‹nr.›</a:t>
             </a:fld>
             <a:endParaRPr lang="nl-NL"/>
           </a:p>
@@ -4019,7 +4056,7 @@
           <a:p>
             <a:fld id="{D5EC4132-83FF-430E-8473-4C6C1D8D7455}" type="slidenum">
               <a:rPr lang="nl-NL" smtClean="0"/>
-              <a:t>‹#›</a:t>
+              <a:t>‹nr.›</a:t>
             </a:fld>
             <a:endParaRPr lang="nl-NL"/>
           </a:p>
@@ -4297,7 +4334,7 @@
           <a:p>
             <a:fld id="{D5EC4132-83FF-430E-8473-4C6C1D8D7455}" type="slidenum">
               <a:rPr lang="nl-NL" smtClean="0"/>
-              <a:t>‹#›</a:t>
+              <a:t>‹nr.›</a:t>
             </a:fld>
             <a:endParaRPr lang="nl-NL"/>
           </a:p>
@@ -4865,7 +4902,7 @@
           <a:p>
             <a:fld id="{D5EC4132-83FF-430E-8473-4C6C1D8D7455}" type="slidenum">
               <a:rPr lang="nl-NL" smtClean="0"/>
-              <a:t>‹#›</a:t>
+              <a:t>‹nr.›</a:t>
             </a:fld>
             <a:endParaRPr lang="nl-NL"/>
           </a:p>
@@ -5143,7 +5180,7 @@
           <a:p>
             <a:fld id="{D5EC4132-83FF-430E-8473-4C6C1D8D7455}" type="slidenum">
               <a:rPr lang="nl-NL" smtClean="0"/>
-              <a:t>‹#›</a:t>
+              <a:t>‹nr.›</a:t>
             </a:fld>
             <a:endParaRPr lang="nl-NL"/>
           </a:p>
@@ -5705,7 +5742,7 @@
           <a:p>
             <a:fld id="{D5EC4132-83FF-430E-8473-4C6C1D8D7455}" type="slidenum">
               <a:rPr lang="nl-NL" smtClean="0"/>
-              <a:t>‹#›</a:t>
+              <a:t>‹nr.›</a:t>
             </a:fld>
             <a:endParaRPr lang="nl-NL"/>
           </a:p>
@@ -6032,7 +6069,7 @@
           <a:p>
             <a:fld id="{D5EC4132-83FF-430E-8473-4C6C1D8D7455}" type="slidenum">
               <a:rPr lang="nl-NL" smtClean="0"/>
-              <a:t>‹#›</a:t>
+              <a:t>‹nr.›</a:t>
             </a:fld>
             <a:endParaRPr lang="nl-NL"/>
           </a:p>
@@ -6209,7 +6246,7 @@
           <a:p>
             <a:fld id="{D5EC4132-83FF-430E-8473-4C6C1D8D7455}" type="slidenum">
               <a:rPr lang="nl-NL" smtClean="0"/>
-              <a:t>‹#›</a:t>
+              <a:t>‹nr.›</a:t>
             </a:fld>
             <a:endParaRPr lang="nl-NL"/>
           </a:p>
@@ -6447,7 +6484,7 @@
           <a:p>
             <a:fld id="{D5EC4132-83FF-430E-8473-4C6C1D8D7455}" type="slidenum">
               <a:rPr lang="nl-NL" smtClean="0"/>
-              <a:t>‹#›</a:t>
+              <a:t>‹nr.›</a:t>
             </a:fld>
             <a:endParaRPr lang="nl-NL"/>
           </a:p>
@@ -6647,7 +6684,7 @@
           <a:p>
             <a:fld id="{D5EC4132-83FF-430E-8473-4C6C1D8D7455}" type="slidenum">
               <a:rPr lang="nl-NL" smtClean="0"/>
-              <a:t>‹#›</a:t>
+              <a:t>‹nr.›</a:t>
             </a:fld>
             <a:endParaRPr lang="nl-NL"/>
           </a:p>
@@ -6923,7 +6960,7 @@
           <a:p>
             <a:fld id="{D5EC4132-83FF-430E-8473-4C6C1D8D7455}" type="slidenum">
               <a:rPr lang="nl-NL" smtClean="0"/>
-              <a:t>‹#›</a:t>
+              <a:t>‹nr.›</a:t>
             </a:fld>
             <a:endParaRPr lang="nl-NL"/>
           </a:p>
@@ -7189,7 +7226,7 @@
           <a:p>
             <a:fld id="{D5EC4132-83FF-430E-8473-4C6C1D8D7455}" type="slidenum">
               <a:rPr lang="nl-NL" smtClean="0"/>
-              <a:t>‹#›</a:t>
+              <a:t>‹nr.›</a:t>
             </a:fld>
             <a:endParaRPr lang="nl-NL"/>
           </a:p>
@@ -7563,7 +7600,7 @@
           <a:p>
             <a:fld id="{D5EC4132-83FF-430E-8473-4C6C1D8D7455}" type="slidenum">
               <a:rPr lang="nl-NL" smtClean="0"/>
-              <a:t>‹#›</a:t>
+              <a:t>‹nr.›</a:t>
             </a:fld>
             <a:endParaRPr lang="nl-NL"/>
           </a:p>
@@ -7711,7 +7748,7 @@
           <a:p>
             <a:fld id="{D5EC4132-83FF-430E-8473-4C6C1D8D7455}" type="slidenum">
               <a:rPr lang="nl-NL" smtClean="0"/>
-              <a:t>‹#›</a:t>
+              <a:t>‹nr.›</a:t>
             </a:fld>
             <a:endParaRPr lang="nl-NL"/>
           </a:p>
@@ -7836,7 +7873,7 @@
           <a:p>
             <a:fld id="{D5EC4132-83FF-430E-8473-4C6C1D8D7455}" type="slidenum">
               <a:rPr lang="nl-NL" smtClean="0"/>
-              <a:t>‹#›</a:t>
+              <a:t>‹nr.›</a:t>
             </a:fld>
             <a:endParaRPr lang="nl-NL"/>
           </a:p>
@@ -8121,7 +8158,7 @@
           <a:p>
             <a:fld id="{D5EC4132-83FF-430E-8473-4C6C1D8D7455}" type="slidenum">
               <a:rPr lang="nl-NL" smtClean="0"/>
-              <a:t>‹#›</a:t>
+              <a:t>‹nr.›</a:t>
             </a:fld>
             <a:endParaRPr lang="nl-NL"/>
           </a:p>
@@ -8445,7 +8482,7 @@
           <a:p>
             <a:fld id="{D5EC4132-83FF-430E-8473-4C6C1D8D7455}" type="slidenum">
               <a:rPr lang="nl-NL" smtClean="0"/>
-              <a:t>‹#›</a:t>
+              <a:t>‹nr.›</a:t>
             </a:fld>
             <a:endParaRPr lang="nl-NL"/>
           </a:p>
@@ -8695,7 +8732,7 @@
           <a:p>
             <a:fld id="{D5EC4132-83FF-430E-8473-4C6C1D8D7455}" type="slidenum">
               <a:rPr lang="nl-NL" smtClean="0"/>
-              <a:t>‹#›</a:t>
+              <a:t>‹nr.›</a:t>
             </a:fld>
             <a:endParaRPr lang="nl-NL"/>
           </a:p>
@@ -9846,6 +9883,130 @@
           </a:p>
         </p:txBody>
       </p:sp>
+      <mc:AlternateContent xmlns:mc="http://schemas.openxmlformats.org/markup-compatibility/2006">
+        <mc:Choice xmlns:am3d="http://schemas.microsoft.com/office/drawing/2017/model3d" Requires="am3d">
+          <p:graphicFrame>
+            <p:nvGraphicFramePr>
+              <p:cNvPr id="4" name="3D-model 3">
+                <a:extLst>
+                  <a:ext uri="{FF2B5EF4-FFF2-40B4-BE49-F238E27FC236}">
+                    <a16:creationId xmlns:a16="http://schemas.microsoft.com/office/drawing/2014/main" id="{D3FD436B-84D2-562C-90F8-F3980E1E393D}"/>
+                  </a:ext>
+                </a:extLst>
+              </p:cNvPr>
+              <p:cNvGraphicFramePr>
+                <a:graphicFrameLocks noChangeAspect="1"/>
+              </p:cNvGraphicFramePr>
+              <p:nvPr>
+                <p:extLst>
+                  <p:ext uri="{D42A27DB-BD31-4B8C-83A1-F6EECF244321}">
+                    <p14:modId xmlns:p14="http://schemas.microsoft.com/office/powerpoint/2010/main" val="3380427729"/>
+                  </p:ext>
+                </p:extLst>
+              </p:nvPr>
+            </p:nvGraphicFramePr>
+            <p:xfrm>
+              <a:off x="5803389" y="480228"/>
+              <a:ext cx="4602725" cy="3411453"/>
+            </p:xfrm>
+            <a:graphic>
+              <a:graphicData uri="http://schemas.microsoft.com/office/drawing/2017/model3d">
+                <am3d:model3d r:embed="rId2">
+                  <am3d:spPr>
+                    <a:xfrm>
+                      <a:off x="0" y="0"/>
+                      <a:ext cx="4602725" cy="3411453"/>
+                    </a:xfrm>
+                    <a:prstGeom prst="rect">
+                      <a:avLst/>
+                    </a:prstGeom>
+                  </am3d:spPr>
+                  <am3d:camera>
+                    <am3d:pos x="0" y="0" z="67055967"/>
+                    <am3d:up dx="0" dy="36000000" dz="0"/>
+                    <am3d:lookAt x="0" y="0" z="0"/>
+                    <am3d:perspective fov="2700000"/>
+                  </am3d:camera>
+                  <am3d:trans>
+                    <am3d:meterPerModelUnit n="3333" d="1000000"/>
+                    <am3d:preTrans dx="-9720000" dy="-9600000" dz="-3240000"/>
+                    <am3d:scale>
+                      <am3d:sx n="1000000" d="1000000"/>
+                      <am3d:sy n="1000000" d="1000000"/>
+                      <am3d:sz n="1000000" d="1000000"/>
+                    </am3d:scale>
+                    <am3d:rot ax="-2992648" ay="75217" az="-89225"/>
+                    <am3d:postTrans dx="0" dy="0" dz="0"/>
+                  </am3d:trans>
+                  <am3d:raster rName="Office3DRenderer" rVer="16.0.8326">
+                    <am3d:blip r:embed="rId3"/>
+                  </am3d:raster>
+                  <am3d:objViewport viewportSz="5418660"/>
+                  <am3d:ambientLight>
+                    <am3d:clr>
+                      <a:scrgbClr r="50000" g="50000" b="50000"/>
+                    </am3d:clr>
+                    <am3d:illuminance n="500000" d="1000000"/>
+                  </am3d:ambientLight>
+                  <am3d:ptLight rad="0">
+                    <am3d:clr>
+                      <a:scrgbClr r="100000" g="75000" b="50000"/>
+                    </am3d:clr>
+                    <am3d:intensity n="9765625" d="1000000"/>
+                    <am3d:pos x="21959998" y="70920001" z="16344003"/>
+                  </am3d:ptLight>
+                  <am3d:ptLight rad="0">
+                    <am3d:clr>
+                      <a:scrgbClr r="40000" g="60000" b="95000"/>
+                    </am3d:clr>
+                    <am3d:intensity n="12250000" d="1000000"/>
+                    <am3d:pos x="-37964106" y="51130435" z="57631972"/>
+                  </am3d:ptLight>
+                  <am3d:ptLight rad="0">
+                    <am3d:clr>
+                      <a:scrgbClr r="86837" g="72700" b="100000"/>
+                    </am3d:clr>
+                    <am3d:intensity n="3125000" d="1000000"/>
+                    <am3d:pos x="-37739122" y="58056624" z="-34769649"/>
+                  </am3d:ptLight>
+                </am3d:model3d>
+              </a:graphicData>
+            </a:graphic>
+          </p:graphicFrame>
+        </mc:Choice>
+        <mc:Fallback>
+          <p:pic>
+            <p:nvPicPr>
+              <p:cNvPr id="4" name="3D-model 3">
+                <a:extLst>
+                  <a:ext uri="{FF2B5EF4-FFF2-40B4-BE49-F238E27FC236}">
+                    <a16:creationId xmlns:a16="http://schemas.microsoft.com/office/drawing/2014/main" id="{D3FD436B-84D2-562C-90F8-F3980E1E393D}"/>
+                  </a:ext>
+                </a:extLst>
+              </p:cNvPr>
+              <p:cNvPicPr>
+                <a:picLocks noGrp="1" noRot="1" noChangeAspect="1" noMove="1" noResize="1" noEditPoints="1" noAdjustHandles="1" noChangeArrowheads="1" noChangeShapeType="1" noCrop="1"/>
+              </p:cNvPicPr>
+              <p:nvPr/>
+            </p:nvPicPr>
+            <p:blipFill>
+              <a:blip r:embed="rId3"/>
+              <a:stretch>
+                <a:fillRect/>
+              </a:stretch>
+            </p:blipFill>
+            <p:spPr>
+              <a:xfrm>
+                <a:off x="5803389" y="480228"/>
+                <a:ext cx="4602725" cy="3411453"/>
+              </a:xfrm>
+              <a:prstGeom prst="rect">
+                <a:avLst/>
+              </a:prstGeom>
+            </p:spPr>
+          </p:pic>
+        </mc:Fallback>
+      </mc:AlternateContent>
     </p:spTree>
     <p:extLst>
       <p:ext uri="{BB962C8B-B14F-4D97-AF65-F5344CB8AC3E}">
@@ -9856,6 +10017,2378 @@
   <p:clrMapOvr>
     <a:masterClrMapping/>
   </p:clrMapOvr>
+  <p:timing>
+    <p:tnLst>
+      <p:par>
+        <p:cTn id="1" dur="indefinite" restart="never" nodeType="tmRoot">
+          <p:childTnLst>
+            <p:seq concurrent="1" nextAc="seek">
+              <p:cTn id="2" dur="indefinite" nodeType="mainSeq">
+                <p:childTnLst>
+                  <p:par>
+                    <p:cTn id="3" fill="hold">
+                      <p:stCondLst>
+                        <p:cond delay="indefinite"/>
+                      </p:stCondLst>
+                      <p:childTnLst>
+                        <p:par>
+                          <p:cTn id="4" fill="hold">
+                            <p:stCondLst>
+                              <p:cond delay="0"/>
+                            </p:stCondLst>
+                            <p:childTnLst>
+                              <p:par>
+                                <p:cTn id="5" presetID="39" presetClass="emph" presetSubtype="2" fill="hold" nodeType="clickEffect">
+                                  <p:stCondLst>
+                                    <p:cond delay="0"/>
+                                  </p:stCondLst>
+                                  <p:childTnLst>
+                                    <p:anim calcmode="lin" valueType="num">
+                                      <p:cBhvr additive="sum">
+                                        <p:cTn id="6" dur="2000" fill="hold"/>
+                                        <p:tgtEl>
+                                          <p:spTgt spid="4"/>
+                                        </p:tgtEl>
+                                        <p:attrNameLst>
+                                          <p:attrName>3d.object.rotation.y</p:attrName>
+                                        </p:attrNameLst>
+                                      </p:cBhvr>
+                                      <p:tavLst>
+                                        <p:tav tm="0">
+                                          <p:val>
+                                            <p:fltVal val="0"/>
+                                          </p:val>
+                                        </p:tav>
+                                        <p:tav tm="1120">
+                                          <p:val>
+                                            <p:fltVal val="-0.0012"/>
+                                          </p:val>
+                                        </p:tav>
+                                        <p:tav tm="2250">
+                                          <p:val>
+                                            <p:fltVal val="-0.0098"/>
+                                          </p:val>
+                                        </p:tav>
+                                        <p:tav tm="3370">
+                                          <p:val>
+                                            <p:fltVal val="-0.033"/>
+                                          </p:val>
+                                        </p:tav>
+                                        <p:tav tm="4490">
+                                          <p:val>
+                                            <p:fltVal val="-0.0789"/>
+                                          </p:val>
+                                        </p:tav>
+                                        <p:tav tm="5620">
+                                          <p:val>
+                                            <p:fltVal val="-0.1548"/>
+                                          </p:val>
+                                        </p:tav>
+                                        <p:tav tm="6740">
+                                          <p:val>
+                                            <p:fltVal val="-0.267"/>
+                                          </p:val>
+                                        </p:tav>
+                                        <p:tav tm="7870">
+                                          <p:val>
+                                            <p:fltVal val="-0.4235"/>
+                                          </p:val>
+                                        </p:tav>
+                                        <p:tav tm="8990">
+                                          <p:val>
+                                            <p:fltVal val="-0.6337"/>
+                                          </p:val>
+                                        </p:tav>
+                                        <p:tav tm="10110">
+                                          <p:val>
+                                            <p:fltVal val="-0.9013"/>
+                                          </p:val>
+                                        </p:tav>
+                                        <p:tav tm="11240">
+                                          <p:val>
+                                            <p:fltVal val="-1.2353"/>
+                                          </p:val>
+                                        </p:tav>
+                                        <p:tav tm="12360">
+                                          <p:val>
+                                            <p:fltVal val="-1.647"/>
+                                          </p:val>
+                                        </p:tav>
+                                        <p:tav tm="13480">
+                                          <p:val>
+                                            <p:fltVal val="-2.0869"/>
+                                          </p:val>
+                                        </p:tav>
+                                        <p:tav tm="14610">
+                                          <p:val>
+                                            <p:fltVal val="-2.4538"/>
+                                          </p:val>
+                                        </p:tav>
+                                        <p:tav tm="15730">
+                                          <p:val>
+                                            <p:fltVal val="-2.7534"/>
+                                          </p:val>
+                                        </p:tav>
+                                        <p:tav tm="16850">
+                                          <p:val>
+                                            <p:fltVal val="-2.9876"/>
+                                          </p:val>
+                                        </p:tav>
+                                        <p:tav tm="17980">
+                                          <p:val>
+                                            <p:fltVal val="-3.1669"/>
+                                          </p:val>
+                                        </p:tav>
+                                        <p:tav tm="19100">
+                                          <p:val>
+                                            <p:fltVal val="-3.2996"/>
+                                          </p:val>
+                                        </p:tav>
+                                        <p:tav tm="20220">
+                                          <p:val>
+                                            <p:fltVal val="-3.3906"/>
+                                          </p:val>
+                                        </p:tav>
+                                        <p:tav tm="21350">
+                                          <p:val>
+                                            <p:fltVal val="-3.4488"/>
+                                          </p:val>
+                                        </p:tav>
+                                        <p:tav tm="22470">
+                                          <p:val>
+                                            <p:fltVal val="-3.4815"/>
+                                          </p:val>
+                                        </p:tav>
+                                        <p:tav tm="23600">
+                                          <p:val>
+                                            <p:fltVal val="-3.4961"/>
+                                          </p:val>
+                                        </p:tav>
+                                        <p:tav tm="24720">
+                                          <p:val>
+                                            <p:fltVal val="-3.4998"/>
+                                          </p:val>
+                                        </p:tav>
+                                        <p:tav tm="25840">
+                                          <p:val>
+                                            <p:fltVal val="-3.0301"/>
+                                          </p:val>
+                                        </p:tav>
+                                        <p:tav tm="26970">
+                                          <p:val>
+                                            <p:fltVal val="-0.9661"/>
+                                          </p:val>
+                                        </p:tav>
+                                        <p:tav tm="28090">
+                                          <p:val>
+                                            <p:fltVal val="2.1525"/>
+                                          </p:val>
+                                        </p:tav>
+                                        <p:tav tm="29210">
+                                          <p:val>
+                                            <p:fltVal val="6.1215"/>
+                                          </p:val>
+                                        </p:tav>
+                                        <p:tav tm="30340">
+                                          <p:val>
+                                            <p:fltVal val="10.8322"/>
+                                          </p:val>
+                                        </p:tav>
+                                        <p:tav tm="31460">
+                                          <p:val>
+                                            <p:fltVal val="16.2132"/>
+                                          </p:val>
+                                        </p:tav>
+                                        <p:tav tm="32580">
+                                          <p:val>
+                                            <p:fltVal val="22.2128"/>
+                                          </p:val>
+                                        </p:tav>
+                                        <p:tav tm="33710">
+                                          <p:val>
+                                            <p:fltVal val="28.7297"/>
+                                          </p:val>
+                                        </p:tav>
+                                        <p:tav tm="34830">
+                                          <p:val>
+                                            <p:fltVal val="35.8493"/>
+                                          </p:val>
+                                        </p:tav>
+                                        <p:tav tm="35960">
+                                          <p:val>
+                                            <p:fltVal val="43.4888"/>
+                                          </p:val>
+                                        </p:tav>
+                                        <p:tav tm="37080">
+                                          <p:val>
+                                            <p:fltVal val="51.6257"/>
+                                          </p:val>
+                                        </p:tav>
+                                        <p:tav tm="38200">
+                                          <p:val>
+                                            <p:fltVal val="60.2402"/>
+                                          </p:val>
+                                        </p:tav>
+                                        <p:tav tm="39330">
+                                          <p:val>
+                                            <p:fltVal val="69.3155"/>
+                                          </p:val>
+                                        </p:tav>
+                                        <p:tav tm="40450">
+                                          <p:val>
+                                            <p:fltVal val="78.8364"/>
+                                          </p:val>
+                                        </p:tav>
+                                        <p:tav tm="41570">
+                                          <p:val>
+                                            <p:fltVal val="88.6987"/>
+                                          </p:val>
+                                        </p:tav>
+                                        <p:tav tm="42700">
+                                          <p:val>
+                                            <p:fltVal val="99.0679"/>
+                                          </p:val>
+                                        </p:tav>
+                                        <p:tav tm="43820">
+                                          <p:val>
+                                            <p:fltVal val="109.8461"/>
+                                          </p:val>
+                                        </p:tav>
+                                        <p:tav tm="44940">
+                                          <p:val>
+                                            <p:fltVal val="121.0232"/>
+                                          </p:val>
+                                        </p:tav>
+                                        <p:tav tm="46070">
+                                          <p:val>
+                                            <p:fltVal val="132.5899"/>
+                                          </p:val>
+                                        </p:tav>
+                                        <p:tav tm="47190">
+                                          <p:val>
+                                            <p:fltVal val="144.5376"/>
+                                          </p:val>
+                                        </p:tav>
+                                        <p:tav tm="48310">
+                                          <p:val>
+                                            <p:fltVal val="156.85851"/>
+                                          </p:val>
+                                        </p:tav>
+                                        <p:tav tm="49440">
+                                          <p:val>
+                                            <p:fltVal val="169.43021"/>
+                                          </p:val>
+                                        </p:tav>
+                                        <p:tav tm="50560">
+                                          <p:val>
+                                            <p:fltVal val="182.34309"/>
+                                          </p:val>
+                                        </p:tav>
+                                        <p:tav tm="51690">
+                                          <p:val>
+                                            <p:fltVal val="195.1411"/>
+                                          </p:val>
+                                        </p:tav>
+                                        <p:tav tm="52810">
+                                          <p:val>
+                                            <p:fltVal val="207.6945"/>
+                                          </p:val>
+                                        </p:tav>
+                                        <p:tav tm="53930">
+                                          <p:val>
+                                            <p:fltVal val="219.77251"/>
+                                          </p:val>
+                                        </p:tav>
+                                        <p:tav tm="55060">
+                                          <p:val>
+                                            <p:fltVal val="231.4814"/>
+                                          </p:val>
+                                        </p:tav>
+                                        <p:tav tm="56180">
+                                          <p:val>
+                                            <p:fltVal val="242.91341"/>
+                                          </p:val>
+                                        </p:tav>
+                                        <p:tav tm="57300">
+                                          <p:val>
+                                            <p:fltVal val="253.8558"/>
+                                          </p:val>
+                                        </p:tav>
+                                        <p:tav tm="58430">
+                                          <p:val>
+                                            <p:fltVal val="264.40329"/>
+                                          </p:val>
+                                        </p:tav>
+                                        <p:tav tm="59550">
+                                          <p:val>
+                                            <p:fltVal val="274.63501"/>
+                                          </p:val>
+                                        </p:tav>
+                                        <p:tav tm="60670">
+                                          <p:val>
+                                            <p:fltVal val="284.35721"/>
+                                          </p:val>
+                                        </p:tav>
+                                        <p:tav tm="61800">
+                                          <p:val>
+                                            <p:fltVal val="293.6507"/>
+                                          </p:val>
+                                        </p:tav>
+                                        <p:tav tm="62920">
+                                          <p:val>
+                                            <p:fltVal val="302.57959"/>
+                                          </p:val>
+                                        </p:tav>
+                                        <p:tav tm="64040">
+                                          <p:val>
+                                            <p:fltVal val="310.96921"/>
+                                          </p:val>
+                                        </p:tav>
+                                        <p:tav tm="65170">
+                                          <p:val>
+                                            <p:fltVal val="318.88379"/>
+                                          </p:val>
+                                        </p:tav>
+                                        <p:tav tm="66290">
+                                          <p:val>
+                                            <p:fltVal val="326.36801"/>
+                                          </p:val>
+                                        </p:tav>
+                                        <p:tav tm="67420">
+                                          <p:val>
+                                            <p:fltVal val="333.26511"/>
+                                          </p:val>
+                                        </p:tav>
+                                        <p:tav tm="68540">
+                                          <p:val>
+                                            <p:fltVal val="339.6712"/>
+                                          </p:val>
+                                        </p:tav>
+                                        <p:tav tm="69660">
+                                          <p:val>
+                                            <p:fltVal val="345.43851"/>
+                                          </p:val>
+                                        </p:tav>
+                                        <p:tav tm="70790">
+                                          <p:val>
+                                            <p:fltVal val="350.58469"/>
+                                          </p:val>
+                                        </p:tav>
+                                        <p:tav tm="71910">
+                                          <p:val>
+                                            <p:fltVal val="355.09189"/>
+                                          </p:val>
+                                        </p:tav>
+                                        <p:tav tm="73030">
+                                          <p:val>
+                                            <p:fltVal val="358.80179"/>
+                                          </p:val>
+                                        </p:tav>
+                                        <p:tav tm="74160">
+                                          <p:val>
+                                            <p:fltVal val="361.63531"/>
+                                          </p:val>
+                                        </p:tav>
+                                        <p:tav tm="75280">
+                                          <p:val>
+                                            <p:fltVal val="363.345"/>
+                                          </p:val>
+                                        </p:tav>
+                                        <p:tav tm="76400">
+                                          <p:val>
+                                            <p:fltVal val="363.4978"/>
+                                          </p:val>
+                                        </p:tav>
+                                        <p:tav tm="77530">
+                                          <p:val>
+                                            <p:fltVal val="363.47061"/>
+                                          </p:val>
+                                        </p:tav>
+                                        <p:tav tm="78650">
+                                          <p:val>
+                                            <p:fltVal val="363.38339"/>
+                                          </p:val>
+                                        </p:tav>
+                                        <p:tav tm="79780">
+                                          <p:val>
+                                            <p:fltVal val="363.20349"/>
+                                          </p:val>
+                                        </p:tav>
+                                        <p:tav tm="80900">
+                                          <p:val>
+                                            <p:fltVal val="362.8963"/>
+                                          </p:val>
+                                        </p:tav>
+                                        <p:tav tm="82020">
+                                          <p:val>
+                                            <p:fltVal val="362.4227"/>
+                                          </p:val>
+                                        </p:tav>
+                                        <p:tav tm="83150">
+                                          <p:val>
+                                            <p:fltVal val="361.7569"/>
+                                          </p:val>
+                                        </p:tav>
+                                        <p:tav tm="84270">
+                                          <p:val>
+                                            <p:fltVal val="361.0874"/>
+                                          </p:val>
+                                        </p:tav>
+                                        <p:tav tm="85390">
+                                          <p:val>
+                                            <p:fltVal val="360.6105"/>
+                                          </p:val>
+                                        </p:tav>
+                                        <p:tav tm="86520">
+                                          <p:val>
+                                            <p:fltVal val="360.30069"/>
+                                          </p:val>
+                                        </p:tav>
+                                        <p:tav tm="87640">
+                                          <p:val>
+                                            <p:fltVal val="360.1188"/>
+                                          </p:val>
+                                        </p:tav>
+                                        <p:tav tm="88760">
+                                          <p:val>
+                                            <p:fltVal val="360.03021"/>
+                                          </p:val>
+                                        </p:tav>
+                                        <p:tav tm="89890">
+                                          <p:val>
+                                            <p:fltVal val="360.00229"/>
+                                          </p:val>
+                                        </p:tav>
+                                        <p:tav tm="91010">
+                                          <p:val>
+                                            <p:fltVal val="360"/>
+                                          </p:val>
+                                        </p:tav>
+                                        <p:tav tm="92130">
+                                          <p:val>
+                                            <p:fltVal val="360"/>
+                                          </p:val>
+                                        </p:tav>
+                                        <p:tav tm="93260">
+                                          <p:val>
+                                            <p:fltVal val="360"/>
+                                          </p:val>
+                                        </p:tav>
+                                        <p:tav tm="94380">
+                                          <p:val>
+                                            <p:fltVal val="360"/>
+                                          </p:val>
+                                        </p:tav>
+                                        <p:tav tm="95510">
+                                          <p:val>
+                                            <p:fltVal val="360"/>
+                                          </p:val>
+                                        </p:tav>
+                                        <p:tav tm="96630">
+                                          <p:val>
+                                            <p:fltVal val="360"/>
+                                          </p:val>
+                                        </p:tav>
+                                        <p:tav tm="97750">
+                                          <p:val>
+                                            <p:fltVal val="360"/>
+                                          </p:val>
+                                        </p:tav>
+                                        <p:tav tm="98880">
+                                          <p:val>
+                                            <p:fltVal val="360"/>
+                                          </p:val>
+                                        </p:tav>
+                                        <p:tav tm="100000">
+                                          <p:val>
+                                            <p:fltVal val="360"/>
+                                          </p:val>
+                                        </p:tav>
+                                      </p:tavLst>
+                                    </p:anim>
+                                    <p:anim calcmode="lin" valueType="num">
+                                      <p:cBhvr additive="sum">
+                                        <p:cTn id="7" dur="2000" fill="hold"/>
+                                        <p:tgtEl>
+                                          <p:spTgt spid="4"/>
+                                        </p:tgtEl>
+                                        <p:attrNameLst>
+                                          <p:attrName>3d.object.translation.y</p:attrName>
+                                        </p:attrNameLst>
+                                      </p:cBhvr>
+                                      <p:tavLst>
+                                        <p:tav tm="0">
+                                          <p:val>
+                                            <p:fltVal val="0"/>
+                                          </p:val>
+                                        </p:tav>
+                                        <p:tav tm="1120">
+                                          <p:val>
+                                            <p:fltVal val="0"/>
+                                          </p:val>
+                                        </p:tav>
+                                        <p:tav tm="2250">
+                                          <p:val>
+                                            <p:fltVal val="-10E-5"/>
+                                          </p:val>
+                                        </p:tav>
+                                        <p:tav tm="3370">
+                                          <p:val>
+                                            <p:fltVal val="-0.0004"/>
+                                          </p:val>
+                                        </p:tav>
+                                        <p:tav tm="4490">
+                                          <p:val>
+                                            <p:fltVal val="-0.0011"/>
+                                          </p:val>
+                                        </p:tav>
+                                        <p:tav tm="5620">
+                                          <p:val>
+                                            <p:fltVal val="-0.0021"/>
+                                          </p:val>
+                                        </p:tav>
+                                        <p:tav tm="6740">
+                                          <p:val>
+                                            <p:fltVal val="-0.0037"/>
+                                          </p:val>
+                                        </p:tav>
+                                        <p:tav tm="7870">
+                                          <p:val>
+                                            <p:fltVal val="-0.0059"/>
+                                          </p:val>
+                                        </p:tav>
+                                        <p:tav tm="8990">
+                                          <p:val>
+                                            <p:fltVal val="-0.0088"/>
+                                          </p:val>
+                                        </p:tav>
+                                        <p:tav tm="10110">
+                                          <p:val>
+                                            <p:fltVal val="-0.0125"/>
+                                          </p:val>
+                                        </p:tav>
+                                        <p:tav tm="11240">
+                                          <p:val>
+                                            <p:fltVal val="-0.0162"/>
+                                          </p:val>
+                                        </p:tav>
+                                        <p:tav tm="12360">
+                                          <p:val>
+                                            <p:fltVal val="-0.0191"/>
+                                          </p:val>
+                                        </p:tav>
+                                        <p:tav tm="13480">
+                                          <p:val>
+                                            <p:fltVal val="-0.0213"/>
+                                          </p:val>
+                                        </p:tav>
+                                        <p:tav tm="14610">
+                                          <p:val>
+                                            <p:fltVal val="-0.0228"/>
+                                          </p:val>
+                                        </p:tav>
+                                        <p:tav tm="15730">
+                                          <p:val>
+                                            <p:fltVal val="-0.0239"/>
+                                          </p:val>
+                                        </p:tav>
+                                        <p:tav tm="16850">
+                                          <p:val>
+                                            <p:fltVal val="-0.0245"/>
+                                          </p:val>
+                                        </p:tav>
+                                        <p:tav tm="17980">
+                                          <p:val>
+                                            <p:fltVal val="-0.0248"/>
+                                          </p:val>
+                                        </p:tav>
+                                        <p:tav tm="19100">
+                                          <p:val>
+                                            <p:fltVal val="-0.0249"/>
+                                          </p:val>
+                                        </p:tav>
+                                        <p:tav tm="20220">
+                                          <p:val>
+                                            <p:fltVal val="-0.0249"/>
+                                          </p:val>
+                                        </p:tav>
+                                        <p:tav tm="21350">
+                                          <p:val>
+                                            <p:fltVal val="-0.0248"/>
+                                          </p:val>
+                                        </p:tav>
+                                        <p:tav tm="22470">
+                                          <p:val>
+                                            <p:fltVal val="-0.0241"/>
+                                          </p:val>
+                                        </p:tav>
+                                        <p:tav tm="23600">
+                                          <p:val>
+                                            <p:fltVal val="-0.022"/>
+                                          </p:val>
+                                        </p:tav>
+                                        <p:tav tm="24720">
+                                          <p:val>
+                                            <p:fltVal val="-0.0179"/>
+                                          </p:val>
+                                        </p:tav>
+                                        <p:tav tm="25840">
+                                          <p:val>
+                                            <p:fltVal val="-0.0113"/>
+                                          </p:val>
+                                        </p:tav>
+                                        <p:tav tm="26970">
+                                          <p:val>
+                                            <p:fltVal val="-0.0013"/>
+                                          </p:val>
+                                        </p:tav>
+                                        <p:tav tm="28090">
+                                          <p:val>
+                                            <p:fltVal val="0.0124"/>
+                                          </p:val>
+                                        </p:tav>
+                                        <p:tav tm="29210">
+                                          <p:val>
+                                            <p:fltVal val="0.0309"/>
+                                          </p:val>
+                                        </p:tav>
+                                        <p:tav tm="30340">
+                                          <p:val>
+                                            <p:fltVal val="0.0546"/>
+                                          </p:val>
+                                        </p:tav>
+                                        <p:tav tm="31460">
+                                          <p:val>
+                                            <p:fltVal val="0.0842"/>
+                                          </p:val>
+                                        </p:tav>
+                                        <p:tav tm="32580">
+                                          <p:val>
+                                            <p:fltVal val="0.1204"/>
+                                          </p:val>
+                                        </p:tav>
+                                        <p:tav tm="33710">
+                                          <p:val>
+                                            <p:fltVal val="0.1634"/>
+                                          </p:val>
+                                        </p:tav>
+                                        <p:tav tm="34830">
+                                          <p:val>
+                                            <p:fltVal val="0.2145"/>
+                                          </p:val>
+                                        </p:tav>
+                                        <p:tav tm="35960">
+                                          <p:val>
+                                            <p:fltVal val="0.2711"/>
+                                          </p:val>
+                                        </p:tav>
+                                        <p:tav tm="37080">
+                                          <p:val>
+                                            <p:fltVal val="0.3207"/>
+                                          </p:val>
+                                        </p:tav>
+                                        <p:tav tm="38200">
+                                          <p:val>
+                                            <p:fltVal val="0.3625"/>
+                                          </p:val>
+                                        </p:tav>
+                                        <p:tav tm="39330">
+                                          <p:val>
+                                            <p:fltVal val="0.3973"/>
+                                          </p:val>
+                                        </p:tav>
+                                        <p:tav tm="40450">
+                                          <p:val>
+                                            <p:fltVal val="0.4256"/>
+                                          </p:val>
+                                        </p:tav>
+                                        <p:tav tm="41570">
+                                          <p:val>
+                                            <p:fltVal val="0.448"/>
+                                          </p:val>
+                                        </p:tav>
+                                        <p:tav tm="42700">
+                                          <p:val>
+                                            <p:fltVal val="0.4655"/>
+                                          </p:val>
+                                        </p:tav>
+                                        <p:tav tm="43820">
+                                          <p:val>
+                                            <p:fltVal val="0.4786"/>
+                                          </p:val>
+                                        </p:tav>
+                                        <p:tav tm="44940">
+                                          <p:val>
+                                            <p:fltVal val="0.4878"/>
+                                          </p:val>
+                                        </p:tav>
+                                        <p:tav tm="46070">
+                                          <p:val>
+                                            <p:fltVal val="0.4939"/>
+                                          </p:val>
+                                        </p:tav>
+                                        <p:tav tm="47190">
+                                          <p:val>
+                                            <p:fltVal val="0.4975"/>
+                                          </p:val>
+                                        </p:tav>
+                                        <p:tav tm="48310">
+                                          <p:val>
+                                            <p:fltVal val="0.4993"/>
+                                          </p:val>
+                                        </p:tav>
+                                        <p:tav tm="49440">
+                                          <p:val>
+                                            <p:fltVal val="0.4999"/>
+                                          </p:val>
+                                        </p:tav>
+                                        <p:tav tm="50560">
+                                          <p:val>
+                                            <p:fltVal val="0.4999"/>
+                                          </p:val>
+                                        </p:tav>
+                                        <p:tav tm="51690">
+                                          <p:val>
+                                            <p:fltVal val="0.4998"/>
+                                          </p:val>
+                                        </p:tav>
+                                        <p:tav tm="52810">
+                                          <p:val>
+                                            <p:fltVal val="0.4988"/>
+                                          </p:val>
+                                        </p:tav>
+                                        <p:tav tm="53930">
+                                          <p:val>
+                                            <p:fltVal val="0.4965"/>
+                                          </p:val>
+                                        </p:tav>
+                                        <p:tav tm="55060">
+                                          <p:val>
+                                            <p:fltVal val="0.4921"/>
+                                          </p:val>
+                                        </p:tav>
+                                        <p:tav tm="56180">
+                                          <p:val>
+                                            <p:fltVal val="0.485"/>
+                                          </p:val>
+                                        </p:tav>
+                                        <p:tav tm="57300">
+                                          <p:val>
+                                            <p:fltVal val="0.4746"/>
+                                          </p:val>
+                                        </p:tav>
+                                        <p:tav tm="58430">
+                                          <p:val>
+                                            <p:fltVal val="0.4603"/>
+                                          </p:val>
+                                        </p:tav>
+                                        <p:tav tm="59550">
+                                          <p:val>
+                                            <p:fltVal val="0.4411"/>
+                                          </p:val>
+                                        </p:tav>
+                                        <p:tav tm="60670">
+                                          <p:val>
+                                            <p:fltVal val="0.4169"/>
+                                          </p:val>
+                                        </p:tav>
+                                        <p:tav tm="61800">
+                                          <p:val>
+                                            <p:fltVal val="0.3868"/>
+                                          </p:val>
+                                        </p:tav>
+                                        <p:tav tm="62920">
+                                          <p:val>
+                                            <p:fltVal val="0.3499"/>
+                                          </p:val>
+                                        </p:tav>
+                                        <p:tav tm="64040">
+                                          <p:val>
+                                            <p:fltVal val="0.306"/>
+                                          </p:val>
+                                        </p:tav>
+                                        <p:tav tm="65170">
+                                          <p:val>
+                                            <p:fltVal val="0.2544"/>
+                                          </p:val>
+                                        </p:tav>
+                                        <p:tav tm="66290">
+                                          <p:val>
+                                            <p:fltVal val="0.1981"/>
+                                          </p:val>
+                                        </p:tav>
+                                        <p:tav tm="67420">
+                                          <p:val>
+                                            <p:fltVal val="0.1498"/>
+                                          </p:val>
+                                        </p:tav>
+                                        <p:tav tm="68540">
+                                          <p:val>
+                                            <p:fltVal val="0.1087"/>
+                                          </p:val>
+                                        </p:tav>
+                                        <p:tav tm="69660">
+                                          <p:val>
+                                            <p:fltVal val="0.0748"/>
+                                          </p:val>
+                                        </p:tav>
+                                        <p:tav tm="70790">
+                                          <p:val>
+                                            <p:fltVal val="0.0473"/>
+                                          </p:val>
+                                        </p:tav>
+                                        <p:tav tm="71910">
+                                          <p:val>
+                                            <p:fltVal val="0.0251"/>
+                                          </p:val>
+                                        </p:tav>
+                                        <p:tav tm="73030">
+                                          <p:val>
+                                            <p:fltVal val="0.0082"/>
+                                          </p:val>
+                                        </p:tav>
+                                        <p:tav tm="74160">
+                                          <p:val>
+                                            <p:fltVal val="-0.0044"/>
+                                          </p:val>
+                                        </p:tav>
+                                        <p:tav tm="75280">
+                                          <p:val>
+                                            <p:fltVal val="-0.0134"/>
+                                          </p:val>
+                                        </p:tav>
+                                        <p:tav tm="76400">
+                                          <p:val>
+                                            <p:fltVal val="-0.0192"/>
+                                          </p:val>
+                                        </p:tav>
+                                        <p:tav tm="77530">
+                                          <p:val>
+                                            <p:fltVal val="-0.0227"/>
+                                          </p:val>
+                                        </p:tav>
+                                        <p:tav tm="78650">
+                                          <p:val>
+                                            <p:fltVal val="-0.0244"/>
+                                          </p:val>
+                                        </p:tav>
+                                        <p:tav tm="79780">
+                                          <p:val>
+                                            <p:fltVal val="-0.0249"/>
+                                          </p:val>
+                                        </p:tav>
+                                        <p:tav tm="80900">
+                                          <p:val>
+                                            <p:fltVal val="-0.0249"/>
+                                          </p:val>
+                                        </p:tav>
+                                        <p:tav tm="82020">
+                                          <p:val>
+                                            <p:fltVal val="-0.0244"/>
+                                          </p:val>
+                                        </p:tav>
+                                        <p:tav tm="83150">
+                                          <p:val>
+                                            <p:fltVal val="-0.0219"/>
+                                          </p:val>
+                                        </p:tav>
+                                        <p:tav tm="84270">
+                                          <p:val>
+                                            <p:fltVal val="-0.0156"/>
+                                          </p:val>
+                                        </p:tav>
+                                        <p:tav tm="85390">
+                                          <p:val>
+                                            <p:fltVal val="-0.0039"/>
+                                          </p:val>
+                                        </p:tav>
+                                        <p:tav tm="86520">
+                                          <p:val>
+                                            <p:fltVal val="0.0104"/>
+                                          </p:val>
+                                        </p:tav>
+                                        <p:tav tm="87640">
+                                          <p:val>
+                                            <p:fltVal val="0.0192"/>
+                                          </p:val>
+                                        </p:tav>
+                                        <p:tav tm="88760">
+                                          <p:val>
+                                            <p:fltVal val="0.0235"/>
+                                          </p:val>
+                                        </p:tav>
+                                        <p:tav tm="89890">
+                                          <p:val>
+                                            <p:fltVal val="0.0248"/>
+                                          </p:val>
+                                        </p:tav>
+                                        <p:tav tm="91010">
+                                          <p:val>
+                                            <p:fltVal val="0.0249"/>
+                                          </p:val>
+                                        </p:tav>
+                                        <p:tav tm="92130">
+                                          <p:val>
+                                            <p:fltVal val="0.0247"/>
+                                          </p:val>
+                                        </p:tav>
+                                        <p:tav tm="93260">
+                                          <p:val>
+                                            <p:fltVal val="0.0234"/>
+                                          </p:val>
+                                        </p:tav>
+                                        <p:tav tm="94380">
+                                          <p:val>
+                                            <p:fltVal val="0.0202"/>
+                                          </p:val>
+                                        </p:tav>
+                                        <p:tav tm="95510">
+                                          <p:val>
+                                            <p:fltVal val="0.0143"/>
+                                          </p:val>
+                                        </p:tav>
+                                        <p:tav tm="96630">
+                                          <p:val>
+                                            <p:fltVal val="0.0071"/>
+                                          </p:val>
+                                        </p:tav>
+                                        <p:tav tm="97750">
+                                          <p:val>
+                                            <p:fltVal val="0.0027"/>
+                                          </p:val>
+                                        </p:tav>
+                                        <p:tav tm="98880">
+                                          <p:val>
+                                            <p:fltVal val="0.0007"/>
+                                          </p:val>
+                                        </p:tav>
+                                        <p:tav tm="100000">
+                                          <p:val>
+                                            <p:fltVal val="0"/>
+                                          </p:val>
+                                        </p:tav>
+                                      </p:tavLst>
+                                    </p:anim>
+                                    <p:anim calcmode="lin" valueType="num">
+                                      <p:cBhvr additive="mult">
+                                        <p:cTn id="8" dur="2000" fill="hold"/>
+                                        <p:tgtEl>
+                                          <p:spTgt spid="4"/>
+                                        </p:tgtEl>
+                                        <p:attrNameLst>
+                                          <p:attrName>3d.object.scale.x</p:attrName>
+                                        </p:attrNameLst>
+                                      </p:cBhvr>
+                                      <p:tavLst>
+                                        <p:tav tm="0">
+                                          <p:val>
+                                            <p:fltVal val="1"/>
+                                          </p:val>
+                                        </p:tav>
+                                        <p:tav tm="1120">
+                                          <p:val>
+                                            <p:fltVal val="1"/>
+                                          </p:val>
+                                        </p:tav>
+                                        <p:tav tm="2250">
+                                          <p:val>
+                                            <p:fltVal val="1.0002"/>
+                                          </p:val>
+                                        </p:tav>
+                                        <p:tav tm="3370">
+                                          <p:val>
+                                            <p:fltVal val="1.0009"/>
+                                          </p:val>
+                                        </p:tav>
+                                        <p:tav tm="4490">
+                                          <p:val>
+                                            <p:fltVal val="1.0023"/>
+                                          </p:val>
+                                        </p:tav>
+                                        <p:tav tm="5620">
+                                          <p:val>
+                                            <p:fltVal val="1.0046"/>
+                                          </p:val>
+                                        </p:tav>
+                                        <p:tav tm="6740">
+                                          <p:val>
+                                            <p:fltVal val="1.008"/>
+                                          </p:val>
+                                        </p:tav>
+                                        <p:tav tm="7870">
+                                          <p:val>
+                                            <p:fltVal val="1.0127"/>
+                                          </p:val>
+                                        </p:tav>
+                                        <p:tav tm="8990">
+                                          <p:val>
+                                            <p:fltVal val="1.019"/>
+                                          </p:val>
+                                        </p:tav>
+                                        <p:tav tm="10110">
+                                          <p:val>
+                                            <p:fltVal val="1.0271"/>
+                                          </p:val>
+                                        </p:tav>
+                                        <p:tav tm="11240">
+                                          <p:val>
+                                            <p:fltVal val="1.0351"/>
+                                          </p:val>
+                                        </p:tav>
+                                        <p:tav tm="12360">
+                                          <p:val>
+                                            <p:fltVal val="1.0414"/>
+                                          </p:val>
+                                        </p:tav>
+                                        <p:tav tm="13480">
+                                          <p:val>
+                                            <p:fltVal val="1.046"/>
+                                          </p:val>
+                                        </p:tav>
+                                        <p:tav tm="14610">
+                                          <p:val>
+                                            <p:fltVal val="1.0494"/>
+                                          </p:val>
+                                        </p:tav>
+                                        <p:tav tm="15730">
+                                          <p:val>
+                                            <p:fltVal val="1.0516"/>
+                                          </p:val>
+                                        </p:tav>
+                                        <p:tav tm="16850">
+                                          <p:val>
+                                            <p:fltVal val="1.053"/>
+                                          </p:val>
+                                        </p:tav>
+                                        <p:tav tm="17980">
+                                          <p:val>
+                                            <p:fltVal val="1.0537"/>
+                                          </p:val>
+                                        </p:tav>
+                                        <p:tav tm="19100">
+                                          <p:val>
+                                            <p:fltVal val="1.0539"/>
+                                          </p:val>
+                                        </p:tav>
+                                        <p:tav tm="20220">
+                                          <p:val>
+                                            <p:fltVal val="1.054"/>
+                                          </p:val>
+                                        </p:tav>
+                                        <p:tav tm="21350">
+                                          <p:val>
+                                            <p:fltVal val="1.0536"/>
+                                          </p:val>
+                                        </p:tav>
+                                        <p:tav tm="22470">
+                                          <p:val>
+                                            <p:fltVal val="1.0515"/>
+                                          </p:val>
+                                        </p:tav>
+                                        <p:tav tm="23600">
+                                          <p:val>
+                                            <p:fltVal val="1.0457"/>
+                                          </p:val>
+                                        </p:tav>
+                                        <p:tav tm="24720">
+                                          <p:val>
+                                            <p:fltVal val="1.0344"/>
+                                          </p:val>
+                                        </p:tav>
+                                        <p:tav tm="25840">
+                                          <p:val>
+                                            <p:fltVal val="1.0183"/>
+                                          </p:val>
+                                        </p:tav>
+                                        <p:tav tm="26970">
+                                          <p:val>
+                                            <p:fltVal val="1.0076"/>
+                                          </p:val>
+                                        </p:tav>
+                                        <p:tav tm="28090">
+                                          <p:val>
+                                            <p:fltVal val="1.0021"/>
+                                          </p:val>
+                                        </p:tav>
+                                        <p:tav tm="29210">
+                                          <p:val>
+                                            <p:fltVal val="1.0002"/>
+                                          </p:val>
+                                        </p:tav>
+                                        <p:tav tm="30340">
+                                          <p:val>
+                                            <p:fltVal val="1"/>
+                                          </p:val>
+                                        </p:tav>
+                                        <p:tav tm="31460">
+                                          <p:val>
+                                            <p:fltVal val="1"/>
+                                          </p:val>
+                                        </p:tav>
+                                        <p:tav tm="32580">
+                                          <p:val>
+                                            <p:fltVal val="1"/>
+                                          </p:val>
+                                        </p:tav>
+                                        <p:tav tm="33710">
+                                          <p:val>
+                                            <p:fltVal val="1"/>
+                                          </p:val>
+                                        </p:tav>
+                                        <p:tav tm="34830">
+                                          <p:val>
+                                            <p:fltVal val="1"/>
+                                          </p:val>
+                                        </p:tav>
+                                        <p:tav tm="35960">
+                                          <p:val>
+                                            <p:fltVal val="1"/>
+                                          </p:val>
+                                        </p:tav>
+                                        <p:tav tm="37080">
+                                          <p:val>
+                                            <p:fltVal val="1"/>
+                                          </p:val>
+                                        </p:tav>
+                                        <p:tav tm="38200">
+                                          <p:val>
+                                            <p:fltVal val="1"/>
+                                          </p:val>
+                                        </p:tav>
+                                        <p:tav tm="39330">
+                                          <p:val>
+                                            <p:fltVal val="1"/>
+                                          </p:val>
+                                        </p:tav>
+                                        <p:tav tm="40450">
+                                          <p:val>
+                                            <p:fltVal val="1"/>
+                                          </p:val>
+                                        </p:tav>
+                                        <p:tav tm="41570">
+                                          <p:val>
+                                            <p:fltVal val="1"/>
+                                          </p:val>
+                                        </p:tav>
+                                        <p:tav tm="42700">
+                                          <p:val>
+                                            <p:fltVal val="1"/>
+                                          </p:val>
+                                        </p:tav>
+                                        <p:tav tm="43820">
+                                          <p:val>
+                                            <p:fltVal val="1"/>
+                                          </p:val>
+                                        </p:tav>
+                                        <p:tav tm="44940">
+                                          <p:val>
+                                            <p:fltVal val="1"/>
+                                          </p:val>
+                                        </p:tav>
+                                        <p:tav tm="46070">
+                                          <p:val>
+                                            <p:fltVal val="1"/>
+                                          </p:val>
+                                        </p:tav>
+                                        <p:tav tm="47190">
+                                          <p:val>
+                                            <p:fltVal val="1"/>
+                                          </p:val>
+                                        </p:tav>
+                                        <p:tav tm="48310">
+                                          <p:val>
+                                            <p:fltVal val="1"/>
+                                          </p:val>
+                                        </p:tav>
+                                        <p:tav tm="49440">
+                                          <p:val>
+                                            <p:fltVal val="1"/>
+                                          </p:val>
+                                        </p:tav>
+                                        <p:tav tm="50560">
+                                          <p:val>
+                                            <p:fltVal val="1"/>
+                                          </p:val>
+                                        </p:tav>
+                                        <p:tav tm="51690">
+                                          <p:val>
+                                            <p:fltVal val="1"/>
+                                          </p:val>
+                                        </p:tav>
+                                        <p:tav tm="52810">
+                                          <p:val>
+                                            <p:fltVal val="1"/>
+                                          </p:val>
+                                        </p:tav>
+                                        <p:tav tm="53930">
+                                          <p:val>
+                                            <p:fltVal val="1"/>
+                                          </p:val>
+                                        </p:tav>
+                                        <p:tav tm="55060">
+                                          <p:val>
+                                            <p:fltVal val="1"/>
+                                          </p:val>
+                                        </p:tav>
+                                        <p:tav tm="56180">
+                                          <p:val>
+                                            <p:fltVal val="1"/>
+                                          </p:val>
+                                        </p:tav>
+                                        <p:tav tm="57300">
+                                          <p:val>
+                                            <p:fltVal val="1"/>
+                                          </p:val>
+                                        </p:tav>
+                                        <p:tav tm="58430">
+                                          <p:val>
+                                            <p:fltVal val="1"/>
+                                          </p:val>
+                                        </p:tav>
+                                        <p:tav tm="59550">
+                                          <p:val>
+                                            <p:fltVal val="1"/>
+                                          </p:val>
+                                        </p:tav>
+                                        <p:tav tm="60670">
+                                          <p:val>
+                                            <p:fltVal val="1"/>
+                                          </p:val>
+                                        </p:tav>
+                                        <p:tav tm="61800">
+                                          <p:val>
+                                            <p:fltVal val="1"/>
+                                          </p:val>
+                                        </p:tav>
+                                        <p:tav tm="62920">
+                                          <p:val>
+                                            <p:fltVal val="1"/>
+                                          </p:val>
+                                        </p:tav>
+                                        <p:tav tm="64040">
+                                          <p:val>
+                                            <p:fltVal val="1"/>
+                                          </p:val>
+                                        </p:tav>
+                                        <p:tav tm="65170">
+                                          <p:val>
+                                            <p:fltVal val="1"/>
+                                          </p:val>
+                                        </p:tav>
+                                        <p:tav tm="66290">
+                                          <p:val>
+                                            <p:fltVal val="1"/>
+                                          </p:val>
+                                        </p:tav>
+                                        <p:tav tm="67420">
+                                          <p:val>
+                                            <p:fltVal val="1"/>
+                                          </p:val>
+                                        </p:tav>
+                                        <p:tav tm="68540">
+                                          <p:val>
+                                            <p:fltVal val="1.0006"/>
+                                          </p:val>
+                                        </p:tav>
+                                        <p:tav tm="69660">
+                                          <p:val>
+                                            <p:fltVal val="1.0024"/>
+                                          </p:val>
+                                        </p:tav>
+                                        <p:tav tm="70790">
+                                          <p:val>
+                                            <p:fltVal val="1.006"/>
+                                          </p:val>
+                                        </p:tav>
+                                        <p:tav tm="71910">
+                                          <p:val>
+                                            <p:fltVal val="1.0121"/>
+                                          </p:val>
+                                        </p:tav>
+                                        <p:tav tm="73030">
+                                          <p:val>
+                                            <p:fltVal val="1.0213"/>
+                                          </p:val>
+                                        </p:tav>
+                                        <p:tav tm="74160">
+                                          <p:val>
+                                            <p:fltVal val="1.0331"/>
+                                          </p:val>
+                                        </p:tav>
+                                        <p:tav tm="75280">
+                                          <p:val>
+                                            <p:fltVal val="1.0422"/>
+                                          </p:val>
+                                        </p:tav>
+                                        <p:tav tm="76400">
+                                          <p:val>
+                                            <p:fltVal val="1.0482"/>
+                                          </p:val>
+                                        </p:tav>
+                                        <p:tav tm="77530">
+                                          <p:val>
+                                            <p:fltVal val="1.0516"/>
+                                          </p:val>
+                                        </p:tav>
+                                        <p:tav tm="78650">
+                                          <p:val>
+                                            <p:fltVal val="1.0534"/>
+                                          </p:val>
+                                        </p:tav>
+                                        <p:tav tm="79780">
+                                          <p:val>
+                                            <p:fltVal val="1.0539"/>
+                                          </p:val>
+                                        </p:tav>
+                                        <p:tav tm="80900">
+                                          <p:val>
+                                            <p:fltVal val="1.0539"/>
+                                          </p:val>
+                                        </p:tav>
+                                        <p:tav tm="82020">
+                                          <p:val>
+                                            <p:fltVal val="1.0534"/>
+                                          </p:val>
+                                        </p:tav>
+                                        <p:tav tm="83150">
+                                          <p:val>
+                                            <p:fltVal val="1.0506"/>
+                                          </p:val>
+                                        </p:tav>
+                                        <p:tav tm="84270">
+                                          <p:val>
+                                            <p:fltVal val="1.0439"/>
+                                          </p:val>
+                                        </p:tav>
+                                        <p:tav tm="85390">
+                                          <p:val>
+                                            <p:fltVal val="1.0312"/>
+                                          </p:val>
+                                        </p:tav>
+                                        <p:tav tm="86520">
+                                          <p:val>
+                                            <p:fltVal val="1.0156"/>
+                                          </p:val>
+                                        </p:tav>
+                                        <p:tav tm="87640">
+                                          <p:val>
+                                            <p:fltVal val="1.0061"/>
+                                          </p:val>
+                                        </p:tav>
+                                        <p:tav tm="88760">
+                                          <p:val>
+                                            <p:fltVal val="1.0015"/>
+                                          </p:val>
+                                        </p:tav>
+                                        <p:tav tm="89890">
+                                          <p:val>
+                                            <p:fltVal val="1.0001"/>
+                                          </p:val>
+                                        </p:tav>
+                                        <p:tav tm="91010">
+                                          <p:val>
+                                            <p:fltVal val="1"/>
+                                          </p:val>
+                                        </p:tav>
+                                        <p:tav tm="92130">
+                                          <p:val>
+                                            <p:fltVal val="1"/>
+                                          </p:val>
+                                        </p:tav>
+                                        <p:tav tm="93260">
+                                          <p:val>
+                                            <p:fltVal val="1"/>
+                                          </p:val>
+                                        </p:tav>
+                                        <p:tav tm="94380">
+                                          <p:val>
+                                            <p:fltVal val="1"/>
+                                          </p:val>
+                                        </p:tav>
+                                        <p:tav tm="95510">
+                                          <p:val>
+                                            <p:fltVal val="1"/>
+                                          </p:val>
+                                        </p:tav>
+                                        <p:tav tm="96630">
+                                          <p:val>
+                                            <p:fltVal val="1"/>
+                                          </p:val>
+                                        </p:tav>
+                                        <p:tav tm="97750">
+                                          <p:val>
+                                            <p:fltVal val="1"/>
+                                          </p:val>
+                                        </p:tav>
+                                        <p:tav tm="98880">
+                                          <p:val>
+                                            <p:fltVal val="1"/>
+                                          </p:val>
+                                        </p:tav>
+                                        <p:tav tm="100000">
+                                          <p:val>
+                                            <p:fltVal val="1"/>
+                                          </p:val>
+                                        </p:tav>
+                                      </p:tavLst>
+                                    </p:anim>
+                                    <p:anim calcmode="lin" valueType="num">
+                                      <p:cBhvr additive="mult">
+                                        <p:cTn id="9" dur="2000" fill="hold"/>
+                                        <p:tgtEl>
+                                          <p:spTgt spid="4"/>
+                                        </p:tgtEl>
+                                        <p:attrNameLst>
+                                          <p:attrName>3d.object.scale.y</p:attrName>
+                                        </p:attrNameLst>
+                                      </p:cBhvr>
+                                      <p:tavLst>
+                                        <p:tav tm="0">
+                                          <p:val>
+                                            <p:fltVal val="1"/>
+                                          </p:val>
+                                        </p:tav>
+                                        <p:tav tm="1120">
+                                          <p:val>
+                                            <p:fltVal val="0.9999"/>
+                                          </p:val>
+                                        </p:tav>
+                                        <p:tav tm="2250">
+                                          <p:val>
+                                            <p:fltVal val="0.9994"/>
+                                          </p:val>
+                                        </p:tav>
+                                        <p:tav tm="3370">
+                                          <p:val>
+                                            <p:fltVal val="0.9981"/>
+                                          </p:val>
+                                        </p:tav>
+                                        <p:tav tm="4490">
+                                          <p:val>
+                                            <p:fltVal val="0.9955"/>
+                                          </p:val>
+                                        </p:tav>
+                                        <p:tav tm="5620">
+                                          <p:val>
+                                            <p:fltVal val="0.9913"/>
+                                          </p:val>
+                                        </p:tav>
+                                        <p:tav tm="6740">
+                                          <p:val>
+                                            <p:fltVal val="0.985"/>
+                                          </p:val>
+                                        </p:tav>
+                                        <p:tav tm="7870">
+                                          <p:val>
+                                            <p:fltVal val="0.9763"/>
+                                          </p:val>
+                                        </p:tav>
+                                        <p:tav tm="8990">
+                                          <p:val>
+                                            <p:fltVal val="0.9646"/>
+                                          </p:val>
+                                        </p:tav>
+                                        <p:tav tm="10110">
+                                          <p:val>
+                                            <p:fltVal val="0.9497"/>
+                                          </p:val>
+                                        </p:tav>
+                                        <p:tav tm="11240">
+                                          <p:val>
+                                            <p:fltVal val="0.9348"/>
+                                          </p:val>
+                                        </p:tav>
+                                        <p:tav tm="12360">
+                                          <p:val>
+                                            <p:fltVal val="0.9232"/>
+                                          </p:val>
+                                        </p:tav>
+                                        <p:tav tm="13480">
+                                          <p:val>
+                                            <p:fltVal val="0.9146"/>
+                                          </p:val>
+                                        </p:tav>
+                                        <p:tav tm="14610">
+                                          <p:val>
+                                            <p:fltVal val="0.9084"/>
+                                          </p:val>
+                                        </p:tav>
+                                        <p:tav tm="15730">
+                                          <p:val>
+                                            <p:fltVal val="0.9042"/>
+                                          </p:val>
+                                        </p:tav>
+                                        <p:tav tm="16850">
+                                          <p:val>
+                                            <p:fltVal val="0.9017"/>
+                                          </p:val>
+                                        </p:tav>
+                                        <p:tav tm="17980">
+                                          <p:val>
+                                            <p:fltVal val="0.9005"/>
+                                          </p:val>
+                                        </p:tav>
+                                        <p:tav tm="19100">
+                                          <p:val>
+                                            <p:fltVal val="0.9"/>
+                                          </p:val>
+                                        </p:tav>
+                                        <p:tav tm="20220">
+                                          <p:val>
+                                            <p:fltVal val="0.8999"/>
+                                          </p:val>
+                                        </p:tav>
+                                        <p:tav tm="21350">
+                                          <p:val>
+                                            <p:fltVal val="0.9006"/>
+                                          </p:val>
+                                        </p:tav>
+                                        <p:tav tm="22470">
+                                          <p:val>
+                                            <p:fltVal val="0.9046"/>
+                                          </p:val>
+                                        </p:tav>
+                                        <p:tav tm="23600">
+                                          <p:val>
+                                            <p:fltVal val="0.9153"/>
+                                          </p:val>
+                                        </p:tav>
+                                        <p:tav tm="24720">
+                                          <p:val>
+                                            <p:fltVal val="0.9362"/>
+                                          </p:val>
+                                        </p:tav>
+                                        <p:tav tm="25840">
+                                          <p:val>
+                                            <p:fltVal val="0.9659"/>
+                                          </p:val>
+                                        </p:tav>
+                                        <p:tav tm="26970">
+                                          <p:val>
+                                            <p:fltVal val="0.9858"/>
+                                          </p:val>
+                                        </p:tav>
+                                        <p:tav tm="28090">
+                                          <p:val>
+                                            <p:fltVal val="0.9959"/>
+                                          </p:val>
+                                        </p:tav>
+                                        <p:tav tm="29210">
+                                          <p:val>
+                                            <p:fltVal val="0.9995"/>
+                                          </p:val>
+                                        </p:tav>
+                                        <p:tav tm="30340">
+                                          <p:val>
+                                            <p:fltVal val="1"/>
+                                          </p:val>
+                                        </p:tav>
+                                        <p:tav tm="31460">
+                                          <p:val>
+                                            <p:fltVal val="1"/>
+                                          </p:val>
+                                        </p:tav>
+                                        <p:tav tm="32580">
+                                          <p:val>
+                                            <p:fltVal val="1"/>
+                                          </p:val>
+                                        </p:tav>
+                                        <p:tav tm="33710">
+                                          <p:val>
+                                            <p:fltVal val="1"/>
+                                          </p:val>
+                                        </p:tav>
+                                        <p:tav tm="34830">
+                                          <p:val>
+                                            <p:fltVal val="1"/>
+                                          </p:val>
+                                        </p:tav>
+                                        <p:tav tm="35960">
+                                          <p:val>
+                                            <p:fltVal val="1"/>
+                                          </p:val>
+                                        </p:tav>
+                                        <p:tav tm="37080">
+                                          <p:val>
+                                            <p:fltVal val="1"/>
+                                          </p:val>
+                                        </p:tav>
+                                        <p:tav tm="38200">
+                                          <p:val>
+                                            <p:fltVal val="1"/>
+                                          </p:val>
+                                        </p:tav>
+                                        <p:tav tm="39330">
+                                          <p:val>
+                                            <p:fltVal val="1"/>
+                                          </p:val>
+                                        </p:tav>
+                                        <p:tav tm="40450">
+                                          <p:val>
+                                            <p:fltVal val="1"/>
+                                          </p:val>
+                                        </p:tav>
+                                        <p:tav tm="41570">
+                                          <p:val>
+                                            <p:fltVal val="1"/>
+                                          </p:val>
+                                        </p:tav>
+                                        <p:tav tm="42700">
+                                          <p:val>
+                                            <p:fltVal val="1"/>
+                                          </p:val>
+                                        </p:tav>
+                                        <p:tav tm="43820">
+                                          <p:val>
+                                            <p:fltVal val="1"/>
+                                          </p:val>
+                                        </p:tav>
+                                        <p:tav tm="44940">
+                                          <p:val>
+                                            <p:fltVal val="1"/>
+                                          </p:val>
+                                        </p:tav>
+                                        <p:tav tm="46070">
+                                          <p:val>
+                                            <p:fltVal val="1"/>
+                                          </p:val>
+                                        </p:tav>
+                                        <p:tav tm="47190">
+                                          <p:val>
+                                            <p:fltVal val="1"/>
+                                          </p:val>
+                                        </p:tav>
+                                        <p:tav tm="48310">
+                                          <p:val>
+                                            <p:fltVal val="1"/>
+                                          </p:val>
+                                        </p:tav>
+                                        <p:tav tm="49440">
+                                          <p:val>
+                                            <p:fltVal val="1"/>
+                                          </p:val>
+                                        </p:tav>
+                                        <p:tav tm="50560">
+                                          <p:val>
+                                            <p:fltVal val="1"/>
+                                          </p:val>
+                                        </p:tav>
+                                        <p:tav tm="51690">
+                                          <p:val>
+                                            <p:fltVal val="1"/>
+                                          </p:val>
+                                        </p:tav>
+                                        <p:tav tm="52810">
+                                          <p:val>
+                                            <p:fltVal val="1"/>
+                                          </p:val>
+                                        </p:tav>
+                                        <p:tav tm="53930">
+                                          <p:val>
+                                            <p:fltVal val="1"/>
+                                          </p:val>
+                                        </p:tav>
+                                        <p:tav tm="55060">
+                                          <p:val>
+                                            <p:fltVal val="1"/>
+                                          </p:val>
+                                        </p:tav>
+                                        <p:tav tm="56180">
+                                          <p:val>
+                                            <p:fltVal val="1"/>
+                                          </p:val>
+                                        </p:tav>
+                                        <p:tav tm="57300">
+                                          <p:val>
+                                            <p:fltVal val="1"/>
+                                          </p:val>
+                                        </p:tav>
+                                        <p:tav tm="58430">
+                                          <p:val>
+                                            <p:fltVal val="1"/>
+                                          </p:val>
+                                        </p:tav>
+                                        <p:tav tm="59550">
+                                          <p:val>
+                                            <p:fltVal val="1"/>
+                                          </p:val>
+                                        </p:tav>
+                                        <p:tav tm="60670">
+                                          <p:val>
+                                            <p:fltVal val="1"/>
+                                          </p:val>
+                                        </p:tav>
+                                        <p:tav tm="61800">
+                                          <p:val>
+                                            <p:fltVal val="1"/>
+                                          </p:val>
+                                        </p:tav>
+                                        <p:tav tm="62920">
+                                          <p:val>
+                                            <p:fltVal val="1"/>
+                                          </p:val>
+                                        </p:tav>
+                                        <p:tav tm="64040">
+                                          <p:val>
+                                            <p:fltVal val="1"/>
+                                          </p:val>
+                                        </p:tav>
+                                        <p:tav tm="65170">
+                                          <p:val>
+                                            <p:fltVal val="1"/>
+                                          </p:val>
+                                        </p:tav>
+                                        <p:tav tm="66290">
+                                          <p:val>
+                                            <p:fltVal val="1"/>
+                                          </p:val>
+                                        </p:tav>
+                                        <p:tav tm="67420">
+                                          <p:val>
+                                            <p:fltVal val="0.9998"/>
+                                          </p:val>
+                                        </p:tav>
+                                        <p:tav tm="68540">
+                                          <p:val>
+                                            <p:fltVal val="0.9987"/>
+                                          </p:val>
+                                        </p:tav>
+                                        <p:tav tm="69660">
+                                          <p:val>
+                                            <p:fltVal val="0.9955"/>
+                                          </p:val>
+                                        </p:tav>
+                                        <p:tav tm="70790">
+                                          <p:val>
+                                            <p:fltVal val="0.9888"/>
+                                          </p:val>
+                                        </p:tav>
+                                        <p:tav tm="71910">
+                                          <p:val>
+                                            <p:fltVal val="0.9775"/>
+                                          </p:val>
+                                        </p:tav>
+                                        <p:tav tm="73030">
+                                          <p:val>
+                                            <p:fltVal val="0.9605"/>
+                                          </p:val>
+                                        </p:tav>
+                                        <p:tav tm="74160">
+                                          <p:val>
+                                            <p:fltVal val="0.9385"/>
+                                          </p:val>
+                                        </p:tav>
+                                        <p:tav tm="75280">
+                                          <p:val>
+                                            <p:fltVal val="0.9217"/>
+                                          </p:val>
+                                        </p:tav>
+                                        <p:tav tm="76400">
+                                          <p:val>
+                                            <p:fltVal val="0.9107"/>
+                                          </p:val>
+                                        </p:tav>
+                                        <p:tav tm="77530">
+                                          <p:val>
+                                            <p:fltVal val="0.9042"/>
+                                          </p:val>
+                                        </p:tav>
+                                        <p:tav tm="78650">
+                                          <p:val>
+                                            <p:fltVal val="0.901"/>
+                                          </p:val>
+                                        </p:tav>
+                                        <p:tav tm="79780">
+                                          <p:val>
+                                            <p:fltVal val="0.9"/>
+                                          </p:val>
+                                        </p:tav>
+                                        <p:tav tm="80900">
+                                          <p:val>
+                                            <p:fltVal val="0.9"/>
+                                          </p:val>
+                                        </p:tav>
+                                        <p:tav tm="82020">
+                                          <p:val>
+                                            <p:fltVal val="0.901"/>
+                                          </p:val>
+                                        </p:tav>
+                                        <p:tav tm="83150">
+                                          <p:val>
+                                            <p:fltVal val="0.9061"/>
+                                          </p:val>
+                                        </p:tav>
+                                        <p:tav tm="84270">
+                                          <p:val>
+                                            <p:fltVal val="0.9186"/>
+                                          </p:val>
+                                        </p:tav>
+                                        <p:tav tm="85390">
+                                          <p:val>
+                                            <p:fltVal val="0.942"/>
+                                          </p:val>
+                                        </p:tav>
+                                        <p:tav tm="86520">
+                                          <p:val>
+                                            <p:fltVal val="0.9709"/>
+                                          </p:val>
+                                        </p:tav>
+                                        <p:tav tm="87640">
+                                          <p:val>
+                                            <p:fltVal val="0.9885"/>
+                                          </p:val>
+                                        </p:tav>
+                                        <p:tav tm="88760">
+                                          <p:val>
+                                            <p:fltVal val="0.997"/>
+                                          </p:val>
+                                        </p:tav>
+                                        <p:tav tm="89890">
+                                          <p:val>
+                                            <p:fltVal val="0.9997"/>
+                                          </p:val>
+                                        </p:tav>
+                                        <p:tav tm="91010">
+                                          <p:val>
+                                            <p:fltVal val="1"/>
+                                          </p:val>
+                                        </p:tav>
+                                        <p:tav tm="92130">
+                                          <p:val>
+                                            <p:fltVal val="1"/>
+                                          </p:val>
+                                        </p:tav>
+                                        <p:tav tm="93260">
+                                          <p:val>
+                                            <p:fltVal val="1"/>
+                                          </p:val>
+                                        </p:tav>
+                                        <p:tav tm="94380">
+                                          <p:val>
+                                            <p:fltVal val="1"/>
+                                          </p:val>
+                                        </p:tav>
+                                        <p:tav tm="95510">
+                                          <p:val>
+                                            <p:fltVal val="1"/>
+                                          </p:val>
+                                        </p:tav>
+                                        <p:tav tm="96630">
+                                          <p:val>
+                                            <p:fltVal val="1"/>
+                                          </p:val>
+                                        </p:tav>
+                                        <p:tav tm="97750">
+                                          <p:val>
+                                            <p:fltVal val="1"/>
+                                          </p:val>
+                                        </p:tav>
+                                        <p:tav tm="98880">
+                                          <p:val>
+                                            <p:fltVal val="1"/>
+                                          </p:val>
+                                        </p:tav>
+                                        <p:tav tm="100000">
+                                          <p:val>
+                                            <p:fltVal val="1"/>
+                                          </p:val>
+                                        </p:tav>
+                                      </p:tavLst>
+                                    </p:anim>
+                                    <p:anim calcmode="lin" valueType="num">
+                                      <p:cBhvr additive="mult">
+                                        <p:cTn id="10" dur="2000" fill="hold"/>
+                                        <p:tgtEl>
+                                          <p:spTgt spid="4"/>
+                                        </p:tgtEl>
+                                        <p:attrNameLst>
+                                          <p:attrName>3d.object.scale.z</p:attrName>
+                                        </p:attrNameLst>
+                                      </p:cBhvr>
+                                      <p:tavLst>
+                                        <p:tav tm="0">
+                                          <p:val>
+                                            <p:fltVal val="1"/>
+                                          </p:val>
+                                        </p:tav>
+                                        <p:tav tm="1120">
+                                          <p:val>
+                                            <p:fltVal val="1"/>
+                                          </p:val>
+                                        </p:tav>
+                                        <p:tav tm="2250">
+                                          <p:val>
+                                            <p:fltVal val="1.0002"/>
+                                          </p:val>
+                                        </p:tav>
+                                        <p:tav tm="3370">
+                                          <p:val>
+                                            <p:fltVal val="1.0009"/>
+                                          </p:val>
+                                        </p:tav>
+                                        <p:tav tm="4490">
+                                          <p:val>
+                                            <p:fltVal val="1.0023"/>
+                                          </p:val>
+                                        </p:tav>
+                                        <p:tav tm="5620">
+                                          <p:val>
+                                            <p:fltVal val="1.0046"/>
+                                          </p:val>
+                                        </p:tav>
+                                        <p:tav tm="6740">
+                                          <p:val>
+                                            <p:fltVal val="1.008"/>
+                                          </p:val>
+                                        </p:tav>
+                                        <p:tav tm="7870">
+                                          <p:val>
+                                            <p:fltVal val="1.0127"/>
+                                          </p:val>
+                                        </p:tav>
+                                        <p:tav tm="8990">
+                                          <p:val>
+                                            <p:fltVal val="1.019"/>
+                                          </p:val>
+                                        </p:tav>
+                                        <p:tav tm="10110">
+                                          <p:val>
+                                            <p:fltVal val="1.0271"/>
+                                          </p:val>
+                                        </p:tav>
+                                        <p:tav tm="11240">
+                                          <p:val>
+                                            <p:fltVal val="1.0351"/>
+                                          </p:val>
+                                        </p:tav>
+                                        <p:tav tm="12360">
+                                          <p:val>
+                                            <p:fltVal val="1.0414"/>
+                                          </p:val>
+                                        </p:tav>
+                                        <p:tav tm="13480">
+                                          <p:val>
+                                            <p:fltVal val="1.046"/>
+                                          </p:val>
+                                        </p:tav>
+                                        <p:tav tm="14610">
+                                          <p:val>
+                                            <p:fltVal val="1.0494"/>
+                                          </p:val>
+                                        </p:tav>
+                                        <p:tav tm="15730">
+                                          <p:val>
+                                            <p:fltVal val="1.0516"/>
+                                          </p:val>
+                                        </p:tav>
+                                        <p:tav tm="16850">
+                                          <p:val>
+                                            <p:fltVal val="1.053"/>
+                                          </p:val>
+                                        </p:tav>
+                                        <p:tav tm="17980">
+                                          <p:val>
+                                            <p:fltVal val="1.0537"/>
+                                          </p:val>
+                                        </p:tav>
+                                        <p:tav tm="19100">
+                                          <p:val>
+                                            <p:fltVal val="1.0539"/>
+                                          </p:val>
+                                        </p:tav>
+                                        <p:tav tm="20220">
+                                          <p:val>
+                                            <p:fltVal val="1.054"/>
+                                          </p:val>
+                                        </p:tav>
+                                        <p:tav tm="21350">
+                                          <p:val>
+                                            <p:fltVal val="1.0536"/>
+                                          </p:val>
+                                        </p:tav>
+                                        <p:tav tm="22470">
+                                          <p:val>
+                                            <p:fltVal val="1.0515"/>
+                                          </p:val>
+                                        </p:tav>
+                                        <p:tav tm="23600">
+                                          <p:val>
+                                            <p:fltVal val="1.0457"/>
+                                          </p:val>
+                                        </p:tav>
+                                        <p:tav tm="24720">
+                                          <p:val>
+                                            <p:fltVal val="1.0344"/>
+                                          </p:val>
+                                        </p:tav>
+                                        <p:tav tm="25840">
+                                          <p:val>
+                                            <p:fltVal val="1.0183"/>
+                                          </p:val>
+                                        </p:tav>
+                                        <p:tav tm="26970">
+                                          <p:val>
+                                            <p:fltVal val="1.0076"/>
+                                          </p:val>
+                                        </p:tav>
+                                        <p:tav tm="28090">
+                                          <p:val>
+                                            <p:fltVal val="1.0021"/>
+                                          </p:val>
+                                        </p:tav>
+                                        <p:tav tm="29210">
+                                          <p:val>
+                                            <p:fltVal val="1.0002"/>
+                                          </p:val>
+                                        </p:tav>
+                                        <p:tav tm="30340">
+                                          <p:val>
+                                            <p:fltVal val="1"/>
+                                          </p:val>
+                                        </p:tav>
+                                        <p:tav tm="31460">
+                                          <p:val>
+                                            <p:fltVal val="1"/>
+                                          </p:val>
+                                        </p:tav>
+                                        <p:tav tm="32580">
+                                          <p:val>
+                                            <p:fltVal val="1"/>
+                                          </p:val>
+                                        </p:tav>
+                                        <p:tav tm="33710">
+                                          <p:val>
+                                            <p:fltVal val="1"/>
+                                          </p:val>
+                                        </p:tav>
+                                        <p:tav tm="34830">
+                                          <p:val>
+                                            <p:fltVal val="1"/>
+                                          </p:val>
+                                        </p:tav>
+                                        <p:tav tm="35960">
+                                          <p:val>
+                                            <p:fltVal val="1"/>
+                                          </p:val>
+                                        </p:tav>
+                                        <p:tav tm="37080">
+                                          <p:val>
+                                            <p:fltVal val="1"/>
+                                          </p:val>
+                                        </p:tav>
+                                        <p:tav tm="38200">
+                                          <p:val>
+                                            <p:fltVal val="1"/>
+                                          </p:val>
+                                        </p:tav>
+                                        <p:tav tm="39330">
+                                          <p:val>
+                                            <p:fltVal val="1"/>
+                                          </p:val>
+                                        </p:tav>
+                                        <p:tav tm="40450">
+                                          <p:val>
+                                            <p:fltVal val="1"/>
+                                          </p:val>
+                                        </p:tav>
+                                        <p:tav tm="41570">
+                                          <p:val>
+                                            <p:fltVal val="1"/>
+                                          </p:val>
+                                        </p:tav>
+                                        <p:tav tm="42700">
+                                          <p:val>
+                                            <p:fltVal val="1"/>
+                                          </p:val>
+                                        </p:tav>
+                                        <p:tav tm="43820">
+                                          <p:val>
+                                            <p:fltVal val="1"/>
+                                          </p:val>
+                                        </p:tav>
+                                        <p:tav tm="44940">
+                                          <p:val>
+                                            <p:fltVal val="1"/>
+                                          </p:val>
+                                        </p:tav>
+                                        <p:tav tm="46070">
+                                          <p:val>
+                                            <p:fltVal val="1"/>
+                                          </p:val>
+                                        </p:tav>
+                                        <p:tav tm="47190">
+                                          <p:val>
+                                            <p:fltVal val="1"/>
+                                          </p:val>
+                                        </p:tav>
+                                        <p:tav tm="48310">
+                                          <p:val>
+                                            <p:fltVal val="1"/>
+                                          </p:val>
+                                        </p:tav>
+                                        <p:tav tm="49440">
+                                          <p:val>
+                                            <p:fltVal val="1"/>
+                                          </p:val>
+                                        </p:tav>
+                                        <p:tav tm="50560">
+                                          <p:val>
+                                            <p:fltVal val="1"/>
+                                          </p:val>
+                                        </p:tav>
+                                        <p:tav tm="51690">
+                                          <p:val>
+                                            <p:fltVal val="1"/>
+                                          </p:val>
+                                        </p:tav>
+                                        <p:tav tm="52810">
+                                          <p:val>
+                                            <p:fltVal val="1"/>
+                                          </p:val>
+                                        </p:tav>
+                                        <p:tav tm="53930">
+                                          <p:val>
+                                            <p:fltVal val="1"/>
+                                          </p:val>
+                                        </p:tav>
+                                        <p:tav tm="55060">
+                                          <p:val>
+                                            <p:fltVal val="1"/>
+                                          </p:val>
+                                        </p:tav>
+                                        <p:tav tm="56180">
+                                          <p:val>
+                                            <p:fltVal val="1"/>
+                                          </p:val>
+                                        </p:tav>
+                                        <p:tav tm="57300">
+                                          <p:val>
+                                            <p:fltVal val="1"/>
+                                          </p:val>
+                                        </p:tav>
+                                        <p:tav tm="58430">
+                                          <p:val>
+                                            <p:fltVal val="1"/>
+                                          </p:val>
+                                        </p:tav>
+                                        <p:tav tm="59550">
+                                          <p:val>
+                                            <p:fltVal val="1"/>
+                                          </p:val>
+                                        </p:tav>
+                                        <p:tav tm="60670">
+                                          <p:val>
+                                            <p:fltVal val="1"/>
+                                          </p:val>
+                                        </p:tav>
+                                        <p:tav tm="61800">
+                                          <p:val>
+                                            <p:fltVal val="1"/>
+                                          </p:val>
+                                        </p:tav>
+                                        <p:tav tm="62920">
+                                          <p:val>
+                                            <p:fltVal val="1"/>
+                                          </p:val>
+                                        </p:tav>
+                                        <p:tav tm="64040">
+                                          <p:val>
+                                            <p:fltVal val="1"/>
+                                          </p:val>
+                                        </p:tav>
+                                        <p:tav tm="65170">
+                                          <p:val>
+                                            <p:fltVal val="1"/>
+                                          </p:val>
+                                        </p:tav>
+                                        <p:tav tm="66290">
+                                          <p:val>
+                                            <p:fltVal val="1"/>
+                                          </p:val>
+                                        </p:tav>
+                                        <p:tav tm="67420">
+                                          <p:val>
+                                            <p:fltVal val="1"/>
+                                          </p:val>
+                                        </p:tav>
+                                        <p:tav tm="68540">
+                                          <p:val>
+                                            <p:fltVal val="1.0006"/>
+                                          </p:val>
+                                        </p:tav>
+                                        <p:tav tm="69660">
+                                          <p:val>
+                                            <p:fltVal val="1.0024"/>
+                                          </p:val>
+                                        </p:tav>
+                                        <p:tav tm="70790">
+                                          <p:val>
+                                            <p:fltVal val="1.006"/>
+                                          </p:val>
+                                        </p:tav>
+                                        <p:tav tm="71910">
+                                          <p:val>
+                                            <p:fltVal val="1.0121"/>
+                                          </p:val>
+                                        </p:tav>
+                                        <p:tav tm="73030">
+                                          <p:val>
+                                            <p:fltVal val="1.0213"/>
+                                          </p:val>
+                                        </p:tav>
+                                        <p:tav tm="74160">
+                                          <p:val>
+                                            <p:fltVal val="1.0331"/>
+                                          </p:val>
+                                        </p:tav>
+                                        <p:tav tm="75280">
+                                          <p:val>
+                                            <p:fltVal val="1.0422"/>
+                                          </p:val>
+                                        </p:tav>
+                                        <p:tav tm="76400">
+                                          <p:val>
+                                            <p:fltVal val="1.0482"/>
+                                          </p:val>
+                                        </p:tav>
+                                        <p:tav tm="77530">
+                                          <p:val>
+                                            <p:fltVal val="1.0516"/>
+                                          </p:val>
+                                        </p:tav>
+                                        <p:tav tm="78650">
+                                          <p:val>
+                                            <p:fltVal val="1.0534"/>
+                                          </p:val>
+                                        </p:tav>
+                                        <p:tav tm="79780">
+                                          <p:val>
+                                            <p:fltVal val="1.0539"/>
+                                          </p:val>
+                                        </p:tav>
+                                        <p:tav tm="80900">
+                                          <p:val>
+                                            <p:fltVal val="1.0539"/>
+                                          </p:val>
+                                        </p:tav>
+                                        <p:tav tm="82020">
+                                          <p:val>
+                                            <p:fltVal val="1.0534"/>
+                                          </p:val>
+                                        </p:tav>
+                                        <p:tav tm="83150">
+                                          <p:val>
+                                            <p:fltVal val="1.0506"/>
+                                          </p:val>
+                                        </p:tav>
+                                        <p:tav tm="84270">
+                                          <p:val>
+                                            <p:fltVal val="1.0439"/>
+                                          </p:val>
+                                        </p:tav>
+                                        <p:tav tm="85390">
+                                          <p:val>
+                                            <p:fltVal val="1.0312"/>
+                                          </p:val>
+                                        </p:tav>
+                                        <p:tav tm="86520">
+                                          <p:val>
+                                            <p:fltVal val="1.0156"/>
+                                          </p:val>
+                                        </p:tav>
+                                        <p:tav tm="87640">
+                                          <p:val>
+                                            <p:fltVal val="1.0061"/>
+                                          </p:val>
+                                        </p:tav>
+                                        <p:tav tm="88760">
+                                          <p:val>
+                                            <p:fltVal val="1.0015"/>
+                                          </p:val>
+                                        </p:tav>
+                                        <p:tav tm="89890">
+                                          <p:val>
+                                            <p:fltVal val="1.0001"/>
+                                          </p:val>
+                                        </p:tav>
+                                        <p:tav tm="91010">
+                                          <p:val>
+                                            <p:fltVal val="1"/>
+                                          </p:val>
+                                        </p:tav>
+                                        <p:tav tm="92130">
+                                          <p:val>
+                                            <p:fltVal val="1"/>
+                                          </p:val>
+                                        </p:tav>
+                                        <p:tav tm="93260">
+                                          <p:val>
+                                            <p:fltVal val="1"/>
+                                          </p:val>
+                                        </p:tav>
+                                        <p:tav tm="94380">
+                                          <p:val>
+                                            <p:fltVal val="1"/>
+                                          </p:val>
+                                        </p:tav>
+                                        <p:tav tm="95510">
+                                          <p:val>
+                                            <p:fltVal val="1"/>
+                                          </p:val>
+                                        </p:tav>
+                                        <p:tav tm="96630">
+                                          <p:val>
+                                            <p:fltVal val="1"/>
+                                          </p:val>
+                                        </p:tav>
+                                        <p:tav tm="97750">
+                                          <p:val>
+                                            <p:fltVal val="1"/>
+                                          </p:val>
+                                        </p:tav>
+                                        <p:tav tm="98880">
+                                          <p:val>
+                                            <p:fltVal val="1"/>
+                                          </p:val>
+                                        </p:tav>
+                                        <p:tav tm="100000">
+                                          <p:val>
+                                            <p:fltVal val="1"/>
+                                          </p:val>
+                                        </p:tav>
+                                      </p:tavLst>
+                                    </p:anim>
+                                  </p:childTnLst>
+                                </p:cTn>
+                              </p:par>
+                            </p:childTnLst>
+                          </p:cTn>
+                        </p:par>
+                      </p:childTnLst>
+                    </p:cTn>
+                  </p:par>
+                </p:childTnLst>
+              </p:cTn>
+              <p:prevCondLst>
+                <p:cond evt="onPrev" delay="0">
+                  <p:tgtEl>
+                    <p:sldTgt/>
+                  </p:tgtEl>
+                </p:cond>
+              </p:prevCondLst>
+              <p:nextCondLst>
+                <p:cond evt="onNext" delay="0">
+                  <p:tgtEl>
+                    <p:sldTgt/>
+                  </p:tgtEl>
+                </p:cond>
+              </p:nextCondLst>
+            </p:seq>
+          </p:childTnLst>
+        </p:cTn>
+      </p:par>
+    </p:tnLst>
+  </p:timing>
 </p:sld>
 </file>
 
@@ -10844,12 +13377,11 @@
 </file>
 
 <file path=customXml/item1.xml><?xml version="1.0" encoding="utf-8"?>
-<?mso-contentType ?>
-<FormTemplates xmlns="http://schemas.microsoft.com/sharepoint/v3/contenttype/forms">
-  <Display>DocumentLibraryForm</Display>
-  <Edit>DocumentLibraryForm</Edit>
-  <New>DocumentLibraryForm</New>
-</FormTemplates>
+<p:properties xmlns:p="http://schemas.microsoft.com/office/2006/metadata/properties" xmlns:xsi="http://www.w3.org/2001/XMLSchema-instance" xmlns:pc="http://schemas.microsoft.com/office/infopath/2007/PartnerControls">
+  <documentManagement>
+    <_activity xmlns="8d5dcd13-9b93-4860-8686-258dec0e23be" xsi:nil="true"/>
+  </documentManagement>
+</p:properties>
 </file>
 
 <file path=customXml/item2.xml><?xml version="1.0" encoding="utf-8"?>
@@ -11047,17 +13579,26 @@
 </file>
 
 <file path=customXml/item3.xml><?xml version="1.0" encoding="utf-8"?>
-<p:properties xmlns:p="http://schemas.microsoft.com/office/2006/metadata/properties" xmlns:xsi="http://www.w3.org/2001/XMLSchema-instance" xmlns:pc="http://schemas.microsoft.com/office/infopath/2007/PartnerControls">
-  <documentManagement>
-    <_activity xmlns="8d5dcd13-9b93-4860-8686-258dec0e23be" xsi:nil="true"/>
-  </documentManagement>
-</p:properties>
+<?mso-contentType ?>
+<FormTemplates xmlns="http://schemas.microsoft.com/sharepoint/v3/contenttype/forms">
+  <Display>DocumentLibraryForm</Display>
+  <Edit>DocumentLibraryForm</Edit>
+  <New>DocumentLibraryForm</New>
+</FormTemplates>
 </file>
 
 <file path=customXml/itemProps1.xml><?xml version="1.0" encoding="utf-8"?>
-<ds:datastoreItem xmlns:ds="http://schemas.openxmlformats.org/officeDocument/2006/customXml" ds:itemID="{33D4CFAA-434D-4462-B62D-1E23E4045646}">
+<ds:datastoreItem xmlns:ds="http://schemas.openxmlformats.org/officeDocument/2006/customXml" ds:itemID="{6BE63DC0-0E79-4D45-AB99-081F8145E24C}">
   <ds:schemaRefs>
-    <ds:schemaRef ds:uri="http://schemas.microsoft.com/sharepoint/v3/contenttype/forms"/>
+    <ds:schemaRef ds:uri="http://purl.org/dc/terms/"/>
+    <ds:schemaRef ds:uri="http://schemas.microsoft.com/office/infopath/2007/PartnerControls"/>
+    <ds:schemaRef ds:uri="http://schemas.openxmlformats.org/package/2006/metadata/core-properties"/>
+    <ds:schemaRef ds:uri="http://purl.org/dc/elements/1.1/"/>
+    <ds:schemaRef ds:uri="http://schemas.microsoft.com/office/2006/documentManagement/types"/>
+    <ds:schemaRef ds:uri="http://www.w3.org/XML/1998/namespace"/>
+    <ds:schemaRef ds:uri="8d5dcd13-9b93-4860-8686-258dec0e23be"/>
+    <ds:schemaRef ds:uri="http://schemas.microsoft.com/office/2006/metadata/properties"/>
+    <ds:schemaRef ds:uri="http://purl.org/dc/dcmitype/"/>
   </ds:schemaRefs>
 </ds:datastoreItem>
 </file>
@@ -11081,17 +13622,9 @@
 </file>
 
 <file path=customXml/itemProps3.xml><?xml version="1.0" encoding="utf-8"?>
-<ds:datastoreItem xmlns:ds="http://schemas.openxmlformats.org/officeDocument/2006/customXml" ds:itemID="{6BE63DC0-0E79-4D45-AB99-081F8145E24C}">
+<ds:datastoreItem xmlns:ds="http://schemas.openxmlformats.org/officeDocument/2006/customXml" ds:itemID="{33D4CFAA-434D-4462-B62D-1E23E4045646}">
   <ds:schemaRefs>
-    <ds:schemaRef ds:uri="http://purl.org/dc/terms/"/>
-    <ds:schemaRef ds:uri="http://schemas.microsoft.com/office/infopath/2007/PartnerControls"/>
-    <ds:schemaRef ds:uri="http://schemas.openxmlformats.org/package/2006/metadata/core-properties"/>
-    <ds:schemaRef ds:uri="http://purl.org/dc/elements/1.1/"/>
-    <ds:schemaRef ds:uri="http://schemas.microsoft.com/office/2006/documentManagement/types"/>
-    <ds:schemaRef ds:uri="http://www.w3.org/XML/1998/namespace"/>
-    <ds:schemaRef ds:uri="8d5dcd13-9b93-4860-8686-258dec0e23be"/>
-    <ds:schemaRef ds:uri="http://schemas.microsoft.com/office/2006/metadata/properties"/>
-    <ds:schemaRef ds:uri="http://purl.org/dc/dcmitype/"/>
+    <ds:schemaRef ds:uri="http://schemas.microsoft.com/sharepoint/v3/contenttype/forms"/>
   </ds:schemaRefs>
 </ds:datastoreItem>
 </file>
</xml_diff>

<commit_message>
Template aangepast van sprint reviews
</commit_message>
<xml_diff>
--- a/Presentaties/Sprint 4.pptx
+++ b/Presentaties/Sprint 4.pptx
@@ -9251,8 +9251,8 @@
           </a:p>
         </p:txBody>
       </p:sp>
-      <mc:AlternateContent xmlns:mc="http://schemas.openxmlformats.org/markup-compatibility/2006">
-        <mc:Choice xmlns:p14="http://schemas.microsoft.com/office/powerpoint/2010/main" xmlns:aink="http://schemas.microsoft.com/office/drawing/2016/ink" Requires="p14 aink">
+      <mc:AlternateContent xmlns:mc="http://schemas.openxmlformats.org/markup-compatibility/2006" xmlns:p14="http://schemas.microsoft.com/office/powerpoint/2010/main" xmlns:aink="http://schemas.microsoft.com/office/drawing/2016/ink">
+        <mc:Choice Requires="p14 aink">
           <p:contentPart p14:bwMode="auto" r:id="rId2">
             <p14:nvContentPartPr>
               <p14:cNvPr id="4" name="Ink 3">
@@ -9271,7 +9271,7 @@
             </p14:xfrm>
           </p:contentPart>
         </mc:Choice>
-        <mc:Fallback>
+        <mc:Fallback xmlns="">
           <p:pic>
             <p:nvPicPr>
               <p:cNvPr id="4" name="Ink 3">
@@ -12919,8 +12919,8 @@
             <a:chExt cx="451080" cy="420480"/>
           </a:xfrm>
         </p:grpSpPr>
-        <mc:AlternateContent xmlns:mc="http://schemas.openxmlformats.org/markup-compatibility/2006">
-          <mc:Choice xmlns:p14="http://schemas.microsoft.com/office/powerpoint/2010/main" xmlns:aink="http://schemas.microsoft.com/office/drawing/2016/ink" Requires="p14 aink">
+        <mc:AlternateContent xmlns:mc="http://schemas.openxmlformats.org/markup-compatibility/2006" xmlns:p14="http://schemas.microsoft.com/office/powerpoint/2010/main" xmlns:aink="http://schemas.microsoft.com/office/drawing/2016/ink">
+          <mc:Choice Requires="p14 aink">
             <p:contentPart p14:bwMode="auto" r:id="rId12">
               <p14:nvContentPartPr>
                 <p14:cNvPr id="11" name="Ink 10">
@@ -12939,7 +12939,7 @@
               </p14:xfrm>
             </p:contentPart>
           </mc:Choice>
-          <mc:Fallback>
+          <mc:Fallback xmlns="">
             <p:pic>
               <p:nvPicPr>
                 <p:cNvPr id="11" name="Ink 10">
@@ -12970,8 +12970,8 @@
             </p:pic>
           </mc:Fallback>
         </mc:AlternateContent>
-        <mc:AlternateContent xmlns:mc="http://schemas.openxmlformats.org/markup-compatibility/2006">
-          <mc:Choice xmlns:p14="http://schemas.microsoft.com/office/powerpoint/2010/main" xmlns:aink="http://schemas.microsoft.com/office/drawing/2016/ink" Requires="p14 aink">
+        <mc:AlternateContent xmlns:mc="http://schemas.openxmlformats.org/markup-compatibility/2006" xmlns:p14="http://schemas.microsoft.com/office/powerpoint/2010/main" xmlns:aink="http://schemas.microsoft.com/office/drawing/2016/ink">
+          <mc:Choice Requires="p14 aink">
             <p:contentPart p14:bwMode="auto" r:id="rId14">
               <p14:nvContentPartPr>
                 <p14:cNvPr id="12" name="Ink 11">
@@ -12990,7 +12990,7 @@
               </p14:xfrm>
             </p:contentPart>
           </mc:Choice>
-          <mc:Fallback>
+          <mc:Fallback xmlns="">
             <p:pic>
               <p:nvPicPr>
                 <p:cNvPr id="12" name="Ink 11">
@@ -13021,8 +13021,8 @@
             </p:pic>
           </mc:Fallback>
         </mc:AlternateContent>
-        <mc:AlternateContent xmlns:mc="http://schemas.openxmlformats.org/markup-compatibility/2006">
-          <mc:Choice xmlns:p14="http://schemas.microsoft.com/office/powerpoint/2010/main" xmlns:aink="http://schemas.microsoft.com/office/drawing/2016/ink" Requires="p14 aink">
+        <mc:AlternateContent xmlns:mc="http://schemas.openxmlformats.org/markup-compatibility/2006" xmlns:p14="http://schemas.microsoft.com/office/powerpoint/2010/main" xmlns:aink="http://schemas.microsoft.com/office/drawing/2016/ink">
+          <mc:Choice Requires="p14 aink">
             <p:contentPart p14:bwMode="auto" r:id="rId16">
               <p14:nvContentPartPr>
                 <p14:cNvPr id="14" name="Ink 13">
@@ -13041,7 +13041,7 @@
               </p14:xfrm>
             </p:contentPart>
           </mc:Choice>
-          <mc:Fallback>
+          <mc:Fallback xmlns="">
             <p:pic>
               <p:nvPicPr>
                 <p:cNvPr id="14" name="Ink 13">
@@ -13093,8 +13093,8 @@
             <a:chExt cx="285120" cy="279720"/>
           </a:xfrm>
         </p:grpSpPr>
-        <mc:AlternateContent xmlns:mc="http://schemas.openxmlformats.org/markup-compatibility/2006">
-          <mc:Choice xmlns:p14="http://schemas.microsoft.com/office/powerpoint/2010/main" xmlns:aink="http://schemas.microsoft.com/office/drawing/2016/ink" Requires="p14 aink">
+        <mc:AlternateContent xmlns:mc="http://schemas.openxmlformats.org/markup-compatibility/2006" xmlns:p14="http://schemas.microsoft.com/office/powerpoint/2010/main" xmlns:aink="http://schemas.microsoft.com/office/drawing/2016/ink">
+          <mc:Choice Requires="p14 aink">
             <p:contentPart p14:bwMode="auto" r:id="rId18">
               <p14:nvContentPartPr>
                 <p14:cNvPr id="18" name="Ink 17">
@@ -13113,7 +13113,7 @@
               </p14:xfrm>
             </p:contentPart>
           </mc:Choice>
-          <mc:Fallback>
+          <mc:Fallback xmlns="">
             <p:pic>
               <p:nvPicPr>
                 <p:cNvPr id="18" name="Ink 17">
@@ -13144,8 +13144,8 @@
             </p:pic>
           </mc:Fallback>
         </mc:AlternateContent>
-        <mc:AlternateContent xmlns:mc="http://schemas.openxmlformats.org/markup-compatibility/2006">
-          <mc:Choice xmlns:p14="http://schemas.microsoft.com/office/powerpoint/2010/main" xmlns:aink="http://schemas.microsoft.com/office/drawing/2016/ink" Requires="p14 aink">
+        <mc:AlternateContent xmlns:mc="http://schemas.openxmlformats.org/markup-compatibility/2006" xmlns:p14="http://schemas.microsoft.com/office/powerpoint/2010/main" xmlns:aink="http://schemas.microsoft.com/office/drawing/2016/ink">
+          <mc:Choice Requires="p14 aink">
             <p:contentPart p14:bwMode="auto" r:id="rId20">
               <p14:nvContentPartPr>
                 <p14:cNvPr id="19" name="Ink 18">
@@ -13164,7 +13164,7 @@
               </p14:xfrm>
             </p:contentPart>
           </mc:Choice>
-          <mc:Fallback>
+          <mc:Fallback xmlns="">
             <p:pic>
               <p:nvPicPr>
                 <p:cNvPr id="19" name="Ink 18">
@@ -14094,12 +14094,11 @@
 </file>
 
 <file path=customXml/item1.xml><?xml version="1.0" encoding="utf-8"?>
-<?mso-contentType ?>
-<FormTemplates xmlns="http://schemas.microsoft.com/sharepoint/v3/contenttype/forms">
-  <Display>DocumentLibraryForm</Display>
-  <Edit>DocumentLibraryForm</Edit>
-  <New>DocumentLibraryForm</New>
-</FormTemplates>
+<p:properties xmlns:p="http://schemas.microsoft.com/office/2006/metadata/properties" xmlns:xsi="http://www.w3.org/2001/XMLSchema-instance" xmlns:pc="http://schemas.microsoft.com/office/infopath/2007/PartnerControls">
+  <documentManagement>
+    <_activity xmlns="8d5dcd13-9b93-4860-8686-258dec0e23be" xsi:nil="true"/>
+  </documentManagement>
+</p:properties>
 </file>
 
 <file path=customXml/item2.xml><?xml version="1.0" encoding="utf-8"?>
@@ -14297,17 +14296,26 @@
 </file>
 
 <file path=customXml/item3.xml><?xml version="1.0" encoding="utf-8"?>
-<p:properties xmlns:p="http://schemas.microsoft.com/office/2006/metadata/properties" xmlns:xsi="http://www.w3.org/2001/XMLSchema-instance" xmlns:pc="http://schemas.microsoft.com/office/infopath/2007/PartnerControls">
-  <documentManagement>
-    <_activity xmlns="8d5dcd13-9b93-4860-8686-258dec0e23be" xsi:nil="true"/>
-  </documentManagement>
-</p:properties>
+<?mso-contentType ?>
+<FormTemplates xmlns="http://schemas.microsoft.com/sharepoint/v3/contenttype/forms">
+  <Display>DocumentLibraryForm</Display>
+  <Edit>DocumentLibraryForm</Edit>
+  <New>DocumentLibraryForm</New>
+</FormTemplates>
 </file>
 
 <file path=customXml/itemProps1.xml><?xml version="1.0" encoding="utf-8"?>
-<ds:datastoreItem xmlns:ds="http://schemas.openxmlformats.org/officeDocument/2006/customXml" ds:itemID="{33D4CFAA-434D-4462-B62D-1E23E4045646}">
+<ds:datastoreItem xmlns:ds="http://schemas.openxmlformats.org/officeDocument/2006/customXml" ds:itemID="{6BE63DC0-0E79-4D45-AB99-081F8145E24C}">
   <ds:schemaRefs>
-    <ds:schemaRef ds:uri="http://schemas.microsoft.com/sharepoint/v3/contenttype/forms"/>
+    <ds:schemaRef ds:uri="http://purl.org/dc/terms/"/>
+    <ds:schemaRef ds:uri="http://schemas.microsoft.com/office/infopath/2007/PartnerControls"/>
+    <ds:schemaRef ds:uri="http://schemas.openxmlformats.org/package/2006/metadata/core-properties"/>
+    <ds:schemaRef ds:uri="http://purl.org/dc/elements/1.1/"/>
+    <ds:schemaRef ds:uri="http://schemas.microsoft.com/office/2006/documentManagement/types"/>
+    <ds:schemaRef ds:uri="http://www.w3.org/XML/1998/namespace"/>
+    <ds:schemaRef ds:uri="8d5dcd13-9b93-4860-8686-258dec0e23be"/>
+    <ds:schemaRef ds:uri="http://schemas.microsoft.com/office/2006/metadata/properties"/>
+    <ds:schemaRef ds:uri="http://purl.org/dc/dcmitype/"/>
   </ds:schemaRefs>
 </ds:datastoreItem>
 </file>
@@ -14331,17 +14339,9 @@
 </file>
 
 <file path=customXml/itemProps3.xml><?xml version="1.0" encoding="utf-8"?>
-<ds:datastoreItem xmlns:ds="http://schemas.openxmlformats.org/officeDocument/2006/customXml" ds:itemID="{6BE63DC0-0E79-4D45-AB99-081F8145E24C}">
+<ds:datastoreItem xmlns:ds="http://schemas.openxmlformats.org/officeDocument/2006/customXml" ds:itemID="{33D4CFAA-434D-4462-B62D-1E23E4045646}">
   <ds:schemaRefs>
-    <ds:schemaRef ds:uri="http://purl.org/dc/terms/"/>
-    <ds:schemaRef ds:uri="http://schemas.microsoft.com/office/infopath/2007/PartnerControls"/>
-    <ds:schemaRef ds:uri="http://schemas.openxmlformats.org/package/2006/metadata/core-properties"/>
-    <ds:schemaRef ds:uri="http://purl.org/dc/elements/1.1/"/>
-    <ds:schemaRef ds:uri="http://schemas.microsoft.com/office/2006/documentManagement/types"/>
-    <ds:schemaRef ds:uri="http://www.w3.org/XML/1998/namespace"/>
-    <ds:schemaRef ds:uri="8d5dcd13-9b93-4860-8686-258dec0e23be"/>
-    <ds:schemaRef ds:uri="http://schemas.microsoft.com/office/2006/metadata/properties"/>
-    <ds:schemaRef ds:uri="http://purl.org/dc/dcmitype/"/>
+    <ds:schemaRef ds:uri="http://schemas.microsoft.com/sharepoint/v3/contenttype/forms"/>
   </ds:schemaRefs>
 </ds:datastoreItem>
 </file>
</xml_diff>